<commit_message>
Updated architecture, bullet list, product description
</commit_message>
<xml_diff>
--- a/docs/images/armory-architecture.pptx
+++ b/docs/images/armory-architecture.pptx
@@ -224,7 +224,7 @@
           <a:p>
             <a:fld id="{49A7721D-1176-A640-AC48-B82F78C92D56}" type="datetimeFigureOut">
               <a:rPr lang="en-US" smtClean="0"/>
-              <a:t>6/28/2021</a:t>
+              <a:t>6/30/2021</a:t>
             </a:fld>
             <a:endParaRPr lang="en-US" dirty="0"/>
           </a:p>
@@ -401,7 +401,7 @@
           <a:p>
             <a:fld id="{C884A089-FB25-6D46-9D21-F0F04A18BCA8}" type="datetimeFigureOut">
               <a:rPr lang="en-US" smtClean="0"/>
-              <a:t>6/28/2021</a:t>
+              <a:t>6/30/2021</a:t>
             </a:fld>
             <a:endParaRPr lang="en-US" dirty="0"/>
           </a:p>
@@ -944,7 +944,7 @@
           <a:p>
             <a:fld id="{C764DE79-268F-4C1A-8933-263129D2AF90}" type="datetimeFigureOut">
               <a:rPr lang="en-US" dirty="0"/>
-              <a:t>6/28/2021</a:t>
+              <a:t>6/30/2021</a:t>
             </a:fld>
             <a:endParaRPr lang="en-US" dirty="0"/>
           </a:p>
@@ -1115,7 +1115,7 @@
           <a:p>
             <a:fld id="{C764DE79-268F-4C1A-8933-263129D2AF90}" type="datetimeFigureOut">
               <a:rPr lang="en-US" dirty="0"/>
-              <a:t>6/28/2021</a:t>
+              <a:t>6/30/2021</a:t>
             </a:fld>
             <a:endParaRPr lang="en-US" dirty="0"/>
           </a:p>
@@ -1296,7 +1296,7 @@
           <a:p>
             <a:fld id="{C764DE79-268F-4C1A-8933-263129D2AF90}" type="datetimeFigureOut">
               <a:rPr lang="en-US" dirty="0"/>
-              <a:t>6/28/2021</a:t>
+              <a:t>6/30/2021</a:t>
             </a:fld>
             <a:endParaRPr lang="en-US" dirty="0"/>
           </a:p>
@@ -1489,7 +1489,7 @@
           <a:p>
             <a:fld id="{C764DE79-268F-4C1A-8933-263129D2AF90}" type="datetimeFigureOut">
               <a:rPr lang="en-US" dirty="0"/>
-              <a:t>6/28/2021</a:t>
+              <a:t>6/30/2021</a:t>
             </a:fld>
             <a:endParaRPr lang="en-US" dirty="0"/>
           </a:p>
@@ -1660,7 +1660,7 @@
           <a:p>
             <a:fld id="{C764DE79-268F-4C1A-8933-263129D2AF90}" type="datetimeFigureOut">
               <a:rPr lang="en-US" dirty="0"/>
-              <a:t>6/28/2021</a:t>
+              <a:t>6/30/2021</a:t>
             </a:fld>
             <a:endParaRPr lang="en-US" dirty="0"/>
           </a:p>
@@ -1905,7 +1905,7 @@
           <a:p>
             <a:fld id="{C764DE79-268F-4C1A-8933-263129D2AF90}" type="datetimeFigureOut">
               <a:rPr lang="en-US" dirty="0"/>
-              <a:t>6/28/2021</a:t>
+              <a:t>6/30/2021</a:t>
             </a:fld>
             <a:endParaRPr lang="en-US" dirty="0"/>
           </a:p>
@@ -2138,7 +2138,7 @@
           <a:p>
             <a:fld id="{C764DE79-268F-4C1A-8933-263129D2AF90}" type="datetimeFigureOut">
               <a:rPr lang="en-US" dirty="0"/>
-              <a:t>6/28/2021</a:t>
+              <a:t>6/30/2021</a:t>
             </a:fld>
             <a:endParaRPr lang="en-US" dirty="0"/>
           </a:p>
@@ -2506,7 +2506,7 @@
           <a:p>
             <a:fld id="{C764DE79-268F-4C1A-8933-263129D2AF90}" type="datetimeFigureOut">
               <a:rPr lang="en-US" dirty="0"/>
-              <a:t>6/28/2021</a:t>
+              <a:t>6/30/2021</a:t>
             </a:fld>
             <a:endParaRPr lang="en-US" dirty="0"/>
           </a:p>
@@ -2625,7 +2625,7 @@
           <a:p>
             <a:fld id="{C764DE79-268F-4C1A-8933-263129D2AF90}" type="datetimeFigureOut">
               <a:rPr lang="en-US" dirty="0"/>
-              <a:t>6/28/2021</a:t>
+              <a:t>6/30/2021</a:t>
             </a:fld>
             <a:endParaRPr lang="en-US" dirty="0"/>
           </a:p>
@@ -2994,7 +2994,7 @@
           <a:p>
             <a:fld id="{C764DE79-268F-4C1A-8933-263129D2AF90}" type="datetimeFigureOut">
               <a:rPr lang="en-US" dirty="0"/>
-              <a:t>6/28/2021</a:t>
+              <a:t>6/30/2021</a:t>
             </a:fld>
             <a:endParaRPr lang="en-US" dirty="0"/>
           </a:p>
@@ -3528,7 +3528,7 @@
           <a:p>
             <a:fld id="{C764DE79-268F-4C1A-8933-263129D2AF90}" type="datetimeFigureOut">
               <a:rPr lang="en-US" dirty="0"/>
-              <a:t>6/28/2021</a:t>
+              <a:t>6/30/2021</a:t>
             </a:fld>
             <a:endParaRPr lang="en-US" dirty="0"/>
           </a:p>
@@ -4194,8 +4194,8 @@
         </p:nvSpPr>
         <p:spPr>
           <a:xfrm>
-            <a:off x="1737360" y="1645920"/>
-            <a:ext cx="10149840" cy="4480560"/>
+            <a:off x="1828800" y="1645920"/>
+            <a:ext cx="10149840" cy="5577840"/>
           </a:xfrm>
           <a:prstGeom prst="rect">
             <a:avLst/>
@@ -4262,7 +4262,7 @@
         <p:spPr>
           <a:xfrm>
             <a:off x="2743200" y="4389120"/>
-            <a:ext cx="1737360" cy="1554480"/>
+            <a:ext cx="1737360" cy="2651760"/>
           </a:xfrm>
           <a:prstGeom prst="rect">
             <a:avLst/>
@@ -4331,7 +4331,7 @@
         <p:spPr>
           <a:xfrm>
             <a:off x="2560319" y="1280160"/>
-            <a:ext cx="2103120" cy="5029200"/>
+            <a:ext cx="2103120" cy="6126480"/>
           </a:xfrm>
           <a:prstGeom prst="rect">
             <a:avLst/>
@@ -4398,7 +4398,7 @@
         <p:spPr>
           <a:xfrm>
             <a:off x="640080" y="914400"/>
-            <a:ext cx="11704320" cy="5760720"/>
+            <a:ext cx="11704320" cy="6675120"/>
           </a:xfrm>
           <a:prstGeom prst="rect">
             <a:avLst/>
@@ -4529,10 +4529,10 @@
       </p:sp>
       <p:sp>
         <p:nvSpPr>
-          <p:cNvPr id="80" name="Rectangle 79">
+          <p:cNvPr id="81" name="Rectangle 80">
             <a:extLst>
               <a:ext uri="{FF2B5EF4-FFF2-40B4-BE49-F238E27FC236}">
-                <a16:creationId xmlns:a16="http://schemas.microsoft.com/office/drawing/2014/main" id="{E8852DB1-68FE-9F4C-8AAC-F033BE8FB59C}"/>
+                <a16:creationId xmlns:a16="http://schemas.microsoft.com/office/drawing/2014/main" id="{BCFAFE42-3485-8444-ACC9-42B82C4BBC28}"/>
               </a:ext>
             </a:extLst>
           </p:cNvPr>
@@ -4541,77 +4541,8 @@
         </p:nvSpPr>
         <p:spPr>
           <a:xfrm>
-            <a:off x="5852160" y="4389120"/>
-            <a:ext cx="1737360" cy="1554480"/>
-          </a:xfrm>
-          <a:prstGeom prst="rect">
-            <a:avLst/>
-          </a:prstGeom>
-          <a:solidFill>
-            <a:srgbClr val="007CBC">
-              <a:alpha val="9804"/>
-            </a:srgbClr>
-          </a:solidFill>
-          <a:ln w="12700">
-            <a:noFill/>
-            <a:prstDash val="solid"/>
-          </a:ln>
-        </p:spPr>
-        <p:style>
-          <a:lnRef idx="2">
-            <a:schemeClr val="accent1">
-              <a:shade val="50000"/>
-            </a:schemeClr>
-          </a:lnRef>
-          <a:fillRef idx="1">
-            <a:schemeClr val="accent1"/>
-          </a:fillRef>
-          <a:effectRef idx="0">
-            <a:schemeClr val="accent1"/>
-          </a:effectRef>
-          <a:fontRef idx="minor">
-            <a:schemeClr val="lt1"/>
-          </a:fontRef>
-        </p:style>
-        <p:txBody>
-          <a:bodyPr rot="0" spcFirstLastPara="0" vertOverflow="overflow" horzOverflow="overflow" vert="horz" wrap="square" lIns="338328" tIns="45720" rIns="91440" bIns="45720" numCol="1" spcCol="0" rtlCol="0" fromWordArt="0" anchor="t" anchorCtr="0" forceAA="0" compatLnSpc="1">
-            <a:prstTxWarp prst="textNoShape">
-              <a:avLst/>
-            </a:prstTxWarp>
-            <a:noAutofit/>
-          </a:bodyPr>
-          <a:lstStyle/>
-          <a:p>
-            <a:pPr algn="l"/>
-            <a:r>
-              <a:rPr lang="en-US" sz="1200" dirty="0">
-                <a:solidFill>
-                  <a:srgbClr val="007DBC"/>
-                </a:solidFill>
-                <a:latin typeface="Arial" panose="020B0604020202020204" pitchFamily="34" charset="0"/>
-                <a:cs typeface="Arial" panose="020B0604020202020204" pitchFamily="34" charset="0"/>
-              </a:rPr>
-              <a:t>Private subnet</a:t>
-            </a:r>
-          </a:p>
-        </p:txBody>
-      </p:sp>
-      <p:sp>
-        <p:nvSpPr>
-          <p:cNvPr id="81" name="Rectangle 80">
-            <a:extLst>
-              <a:ext uri="{FF2B5EF4-FFF2-40B4-BE49-F238E27FC236}">
-                <a16:creationId xmlns:a16="http://schemas.microsoft.com/office/drawing/2014/main" id="{BCFAFE42-3485-8444-ACC9-42B82C4BBC28}"/>
-              </a:ext>
-            </a:extLst>
-          </p:cNvPr>
-          <p:cNvSpPr/>
-          <p:nvPr/>
-        </p:nvSpPr>
-        <p:spPr>
-          <a:xfrm>
             <a:off x="5669280" y="1280160"/>
-            <a:ext cx="2103120" cy="5029200"/>
+            <a:ext cx="2103120" cy="6126480"/>
           </a:xfrm>
           <a:prstGeom prst="rect">
             <a:avLst/>
@@ -4787,7 +4718,7 @@
         <p:spPr>
           <a:xfrm>
             <a:off x="7955280" y="1280160"/>
-            <a:ext cx="2103120" cy="5029200"/>
+            <a:ext cx="2103120" cy="6126480"/>
           </a:xfrm>
           <a:prstGeom prst="rect">
             <a:avLst/>
@@ -4835,75 +4766,6 @@
                 <a:cs typeface="Arial" panose="020B0604020202020204" pitchFamily="34" charset="0"/>
               </a:rPr>
               <a:t>Availability Zone 3</a:t>
-            </a:r>
-          </a:p>
-        </p:txBody>
-      </p:sp>
-      <p:sp>
-        <p:nvSpPr>
-          <p:cNvPr id="41" name="Rectangle 40">
-            <a:extLst>
-              <a:ext uri="{FF2B5EF4-FFF2-40B4-BE49-F238E27FC236}">
-                <a16:creationId xmlns:a16="http://schemas.microsoft.com/office/drawing/2014/main" id="{C864122E-AC93-A24C-8659-4865233C9BBF}"/>
-              </a:ext>
-            </a:extLst>
-          </p:cNvPr>
-          <p:cNvSpPr/>
-          <p:nvPr/>
-        </p:nvSpPr>
-        <p:spPr>
-          <a:xfrm>
-            <a:off x="8138160" y="4389120"/>
-            <a:ext cx="1737360" cy="1554480"/>
-          </a:xfrm>
-          <a:prstGeom prst="rect">
-            <a:avLst/>
-          </a:prstGeom>
-          <a:solidFill>
-            <a:srgbClr val="007CBC">
-              <a:alpha val="9804"/>
-            </a:srgbClr>
-          </a:solidFill>
-          <a:ln w="12700">
-            <a:noFill/>
-            <a:prstDash val="solid"/>
-          </a:ln>
-        </p:spPr>
-        <p:style>
-          <a:lnRef idx="2">
-            <a:schemeClr val="accent1">
-              <a:shade val="50000"/>
-            </a:schemeClr>
-          </a:lnRef>
-          <a:fillRef idx="1">
-            <a:schemeClr val="accent1"/>
-          </a:fillRef>
-          <a:effectRef idx="0">
-            <a:schemeClr val="accent1"/>
-          </a:effectRef>
-          <a:fontRef idx="minor">
-            <a:schemeClr val="lt1"/>
-          </a:fontRef>
-        </p:style>
-        <p:txBody>
-          <a:bodyPr rot="0" spcFirstLastPara="0" vertOverflow="overflow" horzOverflow="overflow" vert="horz" wrap="square" lIns="338328" tIns="45720" rIns="91440" bIns="45720" numCol="1" spcCol="0" rtlCol="0" fromWordArt="0" anchor="t" anchorCtr="0" forceAA="0" compatLnSpc="1">
-            <a:prstTxWarp prst="textNoShape">
-              <a:avLst/>
-            </a:prstTxWarp>
-            <a:noAutofit/>
-          </a:bodyPr>
-          <a:lstStyle/>
-          <a:p>
-            <a:pPr algn="l"/>
-            <a:r>
-              <a:rPr lang="en-US" sz="1200" dirty="0">
-                <a:solidFill>
-                  <a:srgbClr val="007DBC"/>
-                </a:solidFill>
-                <a:latin typeface="Arial" panose="020B0604020202020204" pitchFamily="34" charset="0"/>
-                <a:cs typeface="Arial" panose="020B0604020202020204" pitchFamily="34" charset="0"/>
-              </a:rPr>
-              <a:t>Private subnet</a:t>
             </a:r>
           </a:p>
         </p:txBody>
@@ -5160,8 +5022,8 @@
         </p:nvSpPr>
         <p:spPr>
           <a:xfrm>
-            <a:off x="10332720" y="5120640"/>
-            <a:ext cx="921984" cy="461665"/>
+            <a:off x="10515600" y="5608320"/>
+            <a:ext cx="1005840" cy="274320"/>
           </a:xfrm>
           <a:prstGeom prst="rect">
             <a:avLst/>
@@ -5180,7 +5042,7 @@
                 <a:latin typeface="Arial" panose="020B0604020202020204" pitchFamily="34" charset="0"/>
                 <a:cs typeface="Arial" panose="020B0604020202020204" pitchFamily="34" charset="0"/>
               </a:rPr>
-              <a:t>Armory container</a:t>
+              <a:t>Containers</a:t>
             </a:r>
             <a:endParaRPr lang="en-US" sz="1200" dirty="0">
               <a:latin typeface="Arial" panose="020B0604020202020204" pitchFamily="34" charset="0"/>
@@ -5228,84 +5090,6 @@
           </a:p>
         </p:txBody>
       </p:sp>
-      <p:sp>
-        <p:nvSpPr>
-          <p:cNvPr id="109" name="TextBox 108">
-            <a:extLst>
-              <a:ext uri="{FF2B5EF4-FFF2-40B4-BE49-F238E27FC236}">
-                <a16:creationId xmlns:a16="http://schemas.microsoft.com/office/drawing/2014/main" id="{C48D5D82-8FD6-D24B-AB92-F95DBBC2EDA7}"/>
-              </a:ext>
-            </a:extLst>
-          </p:cNvPr>
-          <p:cNvSpPr txBox="1"/>
-          <p:nvPr/>
-        </p:nvSpPr>
-        <p:spPr>
-          <a:xfrm>
-            <a:off x="6035040" y="5394960"/>
-            <a:ext cx="1478121" cy="276999"/>
-          </a:xfrm>
-          <a:prstGeom prst="rect">
-            <a:avLst/>
-          </a:prstGeom>
-          <a:noFill/>
-        </p:spPr>
-        <p:txBody>
-          <a:bodyPr wrap="square" rtlCol="0" anchor="t">
-            <a:spAutoFit/>
-          </a:bodyPr>
-          <a:lstStyle/>
-          <a:p>
-            <a:pPr algn="ctr"/>
-            <a:r>
-              <a:rPr lang="en-US" sz="1200" dirty="0">
-                <a:latin typeface="Arial" panose="020B0604020202020204" pitchFamily="34" charset="0"/>
-                <a:cs typeface="Arial" panose="020B0604020202020204" pitchFamily="34" charset="0"/>
-              </a:rPr>
-              <a:t>Kubernetes nodes</a:t>
-            </a:r>
-          </a:p>
-        </p:txBody>
-      </p:sp>
-      <p:sp>
-        <p:nvSpPr>
-          <p:cNvPr id="110" name="TextBox 109">
-            <a:extLst>
-              <a:ext uri="{FF2B5EF4-FFF2-40B4-BE49-F238E27FC236}">
-                <a16:creationId xmlns:a16="http://schemas.microsoft.com/office/drawing/2014/main" id="{E95A7894-579D-C148-940E-010DD9088384}"/>
-              </a:ext>
-            </a:extLst>
-          </p:cNvPr>
-          <p:cNvSpPr txBox="1"/>
-          <p:nvPr/>
-        </p:nvSpPr>
-        <p:spPr>
-          <a:xfrm>
-            <a:off x="8229600" y="5394960"/>
-            <a:ext cx="1526302" cy="276999"/>
-          </a:xfrm>
-          <a:prstGeom prst="rect">
-            <a:avLst/>
-          </a:prstGeom>
-          <a:noFill/>
-        </p:spPr>
-        <p:txBody>
-          <a:bodyPr wrap="square" rtlCol="0" anchor="t">
-            <a:spAutoFit/>
-          </a:bodyPr>
-          <a:lstStyle/>
-          <a:p>
-            <a:pPr algn="ctr"/>
-            <a:r>
-              <a:rPr lang="en-US" sz="1200" dirty="0">
-                <a:latin typeface="Arial" panose="020B0604020202020204" pitchFamily="34" charset="0"/>
-                <a:cs typeface="Arial" panose="020B0604020202020204" pitchFamily="34" charset="0"/>
-              </a:rPr>
-              <a:t>Kubernetes nodes</a:t>
-            </a:r>
-          </a:p>
-        </p:txBody>
-      </p:sp>
       <p:pic>
         <p:nvPicPr>
           <p:cNvPr id="72" name="Graphic 8">
@@ -5335,7 +5119,7 @@
         </p:blipFill>
         <p:spPr bwMode="auto">
           <a:xfrm>
-            <a:off x="10424160" y="3291840"/>
+            <a:off x="10515600" y="3291840"/>
             <a:ext cx="762000" cy="762000"/>
           </a:xfrm>
           <a:prstGeom prst="rect">
@@ -5382,7 +5166,7 @@
         </p:nvSpPr>
         <p:spPr bwMode="auto">
           <a:xfrm>
-            <a:off x="10259189" y="4114800"/>
+            <a:off x="10370820" y="4067175"/>
             <a:ext cx="1069991" cy="276999"/>
           </a:xfrm>
           <a:prstGeom prst="rect">
@@ -6357,7 +6141,7 @@
         </p:blipFill>
         <p:spPr bwMode="auto">
           <a:xfrm>
-            <a:off x="12618720" y="4415790"/>
+            <a:off x="12618720" y="5008665"/>
             <a:ext cx="1143000" cy="952500"/>
           </a:xfrm>
           <a:prstGeom prst="rect">
@@ -6391,8 +6175,8 @@
         </p:nvSpPr>
         <p:spPr bwMode="auto">
           <a:xfrm>
-            <a:off x="12692530" y="5376032"/>
-            <a:ext cx="995379" cy="461665"/>
+            <a:off x="12692530" y="5963606"/>
+            <a:ext cx="995379" cy="276999"/>
           </a:xfrm>
           <a:prstGeom prst="rect">
             <a:avLst/>
@@ -6526,12 +6310,12 @@
           <a:p>
             <a:pPr algn="ctr" eaLnBrk="1" hangingPunct="1"/>
             <a:r>
-              <a:rPr lang="en-US" altLang="en-US" sz="1200">
+              <a:rPr lang="en-US" altLang="en-US" sz="1200" smtClean="0">
                 <a:latin typeface="Arial" panose="020B0604020202020204" pitchFamily="34" charset="0"/>
                 <a:ea typeface="Amazon Ember" panose="020B0603020204020204" pitchFamily="34" charset="0"/>
                 <a:cs typeface="Arial" panose="020B0604020202020204" pitchFamily="34" charset="0"/>
               </a:rPr>
-              <a:t>GitHub respository</a:t>
+              <a:t>GitHub</a:t>
             </a:r>
             <a:endParaRPr lang="en-US" altLang="en-US" sz="1200" dirty="0">
               <a:latin typeface="Arial" panose="020B0604020202020204" pitchFamily="34" charset="0"/>
@@ -6630,7 +6414,7 @@
         </p:blipFill>
         <p:spPr bwMode="auto">
           <a:xfrm>
-            <a:off x="10424160" y="1920240"/>
+            <a:off x="10515600" y="1920240"/>
             <a:ext cx="762000" cy="762000"/>
           </a:xfrm>
           <a:prstGeom prst="rect">
@@ -6677,7 +6461,7 @@
         </p:nvSpPr>
         <p:spPr bwMode="auto">
           <a:xfrm>
-            <a:off x="10241280" y="2743200"/>
+            <a:off x="10351770" y="2695575"/>
             <a:ext cx="1097280" cy="274320"/>
           </a:xfrm>
           <a:prstGeom prst="rect">
@@ -6856,7 +6640,7 @@
         </p:blipFill>
         <p:spPr bwMode="auto">
           <a:xfrm>
-            <a:off x="10515600" y="4663440"/>
+            <a:off x="10789920" y="5141595"/>
             <a:ext cx="457200" cy="457200"/>
           </a:xfrm>
           <a:prstGeom prst="rect">
@@ -6949,126 +6733,6 @@
       </p:pic>
       <p:pic>
         <p:nvPicPr>
-          <p:cNvPr id="117" name="Graphic 62">
-            <a:extLst>
-              <a:ext uri="{FF2B5EF4-FFF2-40B4-BE49-F238E27FC236}">
-                <a16:creationId xmlns:a16="http://schemas.microsoft.com/office/drawing/2014/main" id="{8B47AFFF-81D9-C348-90A5-553E82D08748}"/>
-              </a:ext>
-            </a:extLst>
-          </p:cNvPr>
-          <p:cNvPicPr>
-            <a:picLocks noChangeAspect="1" noChangeArrowheads="1"/>
-          </p:cNvPicPr>
-          <p:nvPr/>
-        </p:nvPicPr>
-        <p:blipFill>
-          <a:blip r:embed="rId29">
-            <a:extLst>
-              <a:ext uri="{28A0092B-C50C-407E-A947-70E740481C1C}">
-                <a14:useLocalDpi xmlns:a14="http://schemas.microsoft.com/office/drawing/2010/main" val="0"/>
-              </a:ext>
-            </a:extLst>
-          </a:blip>
-          <a:srcRect/>
-          <a:stretch>
-            <a:fillRect/>
-          </a:stretch>
-        </p:blipFill>
-        <p:spPr bwMode="auto">
-          <a:xfrm>
-            <a:off x="6492240" y="4937760"/>
-            <a:ext cx="457200" cy="457200"/>
-          </a:xfrm>
-          <a:prstGeom prst="rect">
-            <a:avLst/>
-          </a:prstGeom>
-          <a:noFill/>
-          <a:ln>
-            <a:noFill/>
-          </a:ln>
-          <a:extLst>
-            <a:ext uri="{909E8E84-426E-40DD-AFC4-6F175D3DCCD1}">
-              <a14:hiddenFill xmlns:a14="http://schemas.microsoft.com/office/drawing/2010/main">
-                <a:solidFill>
-                  <a:srgbClr val="FFFFFF"/>
-                </a:solidFill>
-              </a14:hiddenFill>
-            </a:ext>
-            <a:ext uri="{91240B29-F687-4F45-9708-019B960494DF}">
-              <a14:hiddenLine xmlns:a14="http://schemas.microsoft.com/office/drawing/2010/main" w="9525">
-                <a:solidFill>
-                  <a:srgbClr val="000000"/>
-                </a:solidFill>
-                <a:miter lim="800000"/>
-                <a:headEnd/>
-                <a:tailEnd/>
-              </a14:hiddenLine>
-            </a:ext>
-          </a:extLst>
-        </p:spPr>
-      </p:pic>
-      <p:pic>
-        <p:nvPicPr>
-          <p:cNvPr id="118" name="Graphic 62">
-            <a:extLst>
-              <a:ext uri="{FF2B5EF4-FFF2-40B4-BE49-F238E27FC236}">
-                <a16:creationId xmlns:a16="http://schemas.microsoft.com/office/drawing/2014/main" id="{8B47AFFF-81D9-C348-90A5-553E82D08748}"/>
-              </a:ext>
-            </a:extLst>
-          </p:cNvPr>
-          <p:cNvPicPr>
-            <a:picLocks noChangeAspect="1" noChangeArrowheads="1"/>
-          </p:cNvPicPr>
-          <p:nvPr/>
-        </p:nvPicPr>
-        <p:blipFill>
-          <a:blip r:embed="rId29">
-            <a:extLst>
-              <a:ext uri="{28A0092B-C50C-407E-A947-70E740481C1C}">
-                <a14:useLocalDpi xmlns:a14="http://schemas.microsoft.com/office/drawing/2010/main" val="0"/>
-              </a:ext>
-            </a:extLst>
-          </a:blip>
-          <a:srcRect/>
-          <a:stretch>
-            <a:fillRect/>
-          </a:stretch>
-        </p:blipFill>
-        <p:spPr bwMode="auto">
-          <a:xfrm>
-            <a:off x="8686800" y="4937760"/>
-            <a:ext cx="457200" cy="457200"/>
-          </a:xfrm>
-          <a:prstGeom prst="rect">
-            <a:avLst/>
-          </a:prstGeom>
-          <a:noFill/>
-          <a:ln>
-            <a:noFill/>
-          </a:ln>
-          <a:extLst>
-            <a:ext uri="{909E8E84-426E-40DD-AFC4-6F175D3DCCD1}">
-              <a14:hiddenFill xmlns:a14="http://schemas.microsoft.com/office/drawing/2010/main">
-                <a:solidFill>
-                  <a:srgbClr val="FFFFFF"/>
-                </a:solidFill>
-              </a14:hiddenFill>
-            </a:ext>
-            <a:ext uri="{91240B29-F687-4F45-9708-019B960494DF}">
-              <a14:hiddenLine xmlns:a14="http://schemas.microsoft.com/office/drawing/2010/main" w="9525">
-                <a:solidFill>
-                  <a:srgbClr val="000000"/>
-                </a:solidFill>
-                <a:miter lim="800000"/>
-                <a:headEnd/>
-                <a:tailEnd/>
-              </a14:hiddenLine>
-            </a:ext>
-          </a:extLst>
-        </p:spPr>
-      </p:pic>
-      <p:pic>
-        <p:nvPicPr>
           <p:cNvPr id="119" name="Graphic 28">
             <a:extLst>
               <a:ext uri="{FF2B5EF4-FFF2-40B4-BE49-F238E27FC236}">
@@ -7189,126 +6853,6 @@
       </p:pic>
       <p:pic>
         <p:nvPicPr>
-          <p:cNvPr id="121" name="Graphic 35">
-            <a:extLst>
-              <a:ext uri="{FF2B5EF4-FFF2-40B4-BE49-F238E27FC236}">
-                <a16:creationId xmlns:a16="http://schemas.microsoft.com/office/drawing/2014/main" id="{6FC3D56A-1081-9B43-9B9C-251CDE8593F4}"/>
-              </a:ext>
-            </a:extLst>
-          </p:cNvPr>
-          <p:cNvPicPr>
-            <a:picLocks noChangeAspect="1" noChangeArrowheads="1"/>
-          </p:cNvPicPr>
-          <p:nvPr/>
-        </p:nvPicPr>
-        <p:blipFill>
-          <a:blip r:embed="rId31">
-            <a:extLst>
-              <a:ext uri="{28A0092B-C50C-407E-A947-70E740481C1C}">
-                <a14:useLocalDpi xmlns:a14="http://schemas.microsoft.com/office/drawing/2010/main" val="0"/>
-              </a:ext>
-            </a:extLst>
-          </a:blip>
-          <a:srcRect/>
-          <a:stretch>
-            <a:fillRect/>
-          </a:stretch>
-        </p:blipFill>
-        <p:spPr bwMode="auto">
-          <a:xfrm>
-            <a:off x="5852160" y="4389120"/>
-            <a:ext cx="274637" cy="274638"/>
-          </a:xfrm>
-          <a:prstGeom prst="rect">
-            <a:avLst/>
-          </a:prstGeom>
-          <a:noFill/>
-          <a:ln>
-            <a:noFill/>
-          </a:ln>
-          <a:extLst>
-            <a:ext uri="{909E8E84-426E-40DD-AFC4-6F175D3DCCD1}">
-              <a14:hiddenFill xmlns:a14="http://schemas.microsoft.com/office/drawing/2010/main">
-                <a:solidFill>
-                  <a:srgbClr val="FFFFFF"/>
-                </a:solidFill>
-              </a14:hiddenFill>
-            </a:ext>
-            <a:ext uri="{91240B29-F687-4F45-9708-019B960494DF}">
-              <a14:hiddenLine xmlns:a14="http://schemas.microsoft.com/office/drawing/2010/main" w="9525">
-                <a:solidFill>
-                  <a:srgbClr val="000000"/>
-                </a:solidFill>
-                <a:miter lim="800000"/>
-                <a:headEnd/>
-                <a:tailEnd/>
-              </a14:hiddenLine>
-            </a:ext>
-          </a:extLst>
-        </p:spPr>
-      </p:pic>
-      <p:pic>
-        <p:nvPicPr>
-          <p:cNvPr id="122" name="Graphic 35">
-            <a:extLst>
-              <a:ext uri="{FF2B5EF4-FFF2-40B4-BE49-F238E27FC236}">
-                <a16:creationId xmlns:a16="http://schemas.microsoft.com/office/drawing/2014/main" id="{6FC3D56A-1081-9B43-9B9C-251CDE8593F4}"/>
-              </a:ext>
-            </a:extLst>
-          </p:cNvPr>
-          <p:cNvPicPr>
-            <a:picLocks noChangeAspect="1" noChangeArrowheads="1"/>
-          </p:cNvPicPr>
-          <p:nvPr/>
-        </p:nvPicPr>
-        <p:blipFill>
-          <a:blip r:embed="rId31">
-            <a:extLst>
-              <a:ext uri="{28A0092B-C50C-407E-A947-70E740481C1C}">
-                <a14:useLocalDpi xmlns:a14="http://schemas.microsoft.com/office/drawing/2010/main" val="0"/>
-              </a:ext>
-            </a:extLst>
-          </a:blip>
-          <a:srcRect/>
-          <a:stretch>
-            <a:fillRect/>
-          </a:stretch>
-        </p:blipFill>
-        <p:spPr bwMode="auto">
-          <a:xfrm>
-            <a:off x="8138400" y="4389120"/>
-            <a:ext cx="274637" cy="274638"/>
-          </a:xfrm>
-          <a:prstGeom prst="rect">
-            <a:avLst/>
-          </a:prstGeom>
-          <a:noFill/>
-          <a:ln>
-            <a:noFill/>
-          </a:ln>
-          <a:extLst>
-            <a:ext uri="{909E8E84-426E-40DD-AFC4-6F175D3DCCD1}">
-              <a14:hiddenFill xmlns:a14="http://schemas.microsoft.com/office/drawing/2010/main">
-                <a:solidFill>
-                  <a:srgbClr val="FFFFFF"/>
-                </a:solidFill>
-              </a14:hiddenFill>
-            </a:ext>
-            <a:ext uri="{91240B29-F687-4F45-9708-019B960494DF}">
-              <a14:hiddenLine xmlns:a14="http://schemas.microsoft.com/office/drawing/2010/main" w="9525">
-                <a:solidFill>
-                  <a:srgbClr val="000000"/>
-                </a:solidFill>
-                <a:miter lim="800000"/>
-                <a:headEnd/>
-                <a:tailEnd/>
-              </a14:hiddenLine>
-            </a:ext>
-          </a:extLst>
-        </p:spPr>
-      </p:pic>
-      <p:pic>
-        <p:nvPicPr>
           <p:cNvPr id="123" name="Graphic 34">
             <a:extLst>
               <a:ext uri="{FF2B5EF4-FFF2-40B4-BE49-F238E27FC236}">
@@ -7618,15 +7162,15 @@
           </p:cNvPr>
           <p:cNvCxnSpPr>
             <a:cxnSpLocks/>
-            <a:stCxn id="115" idx="3"/>
+            <a:stCxn id="82" idx="3"/>
             <a:endCxn id="108" idx="1"/>
           </p:cNvCxnSpPr>
           <p:nvPr/>
         </p:nvCxnSpPr>
         <p:spPr>
-          <a:xfrm>
-            <a:off x="10972800" y="4892040"/>
-            <a:ext cx="1645920" cy="0"/>
+          <a:xfrm flipV="1">
+            <a:off x="11704320" y="5484915"/>
+            <a:ext cx="914400" cy="1485"/>
           </a:xfrm>
           <a:prstGeom prst="straightConnector1">
             <a:avLst/>
@@ -7748,6 +7292,1922 @@
           </a:fontRef>
         </p:style>
       </p:cxnSp>
+      <p:sp>
+        <p:nvSpPr>
+          <p:cNvPr id="82" name="Rectangle 81">
+            <a:extLst>
+              <a:ext uri="{FF2B5EF4-FFF2-40B4-BE49-F238E27FC236}">
+                <a16:creationId xmlns:a16="http://schemas.microsoft.com/office/drawing/2014/main" id="{FFA89DF7-D079-0947-8E29-4EEA4975DBBD}"/>
+              </a:ext>
+            </a:extLst>
+          </p:cNvPr>
+          <p:cNvSpPr/>
+          <p:nvPr/>
+        </p:nvSpPr>
+        <p:spPr>
+          <a:xfrm>
+            <a:off x="10332720" y="4754880"/>
+            <a:ext cx="1371600" cy="1463040"/>
+          </a:xfrm>
+          <a:prstGeom prst="rect">
+            <a:avLst/>
+          </a:prstGeom>
+          <a:noFill/>
+          <a:ln w="12700">
+            <a:solidFill>
+              <a:srgbClr val="5A6B86"/>
+            </a:solidFill>
+            <a:prstDash val="dash"/>
+          </a:ln>
+        </p:spPr>
+        <p:style>
+          <a:lnRef idx="2">
+            <a:schemeClr val="accent1">
+              <a:shade val="50000"/>
+            </a:schemeClr>
+          </a:lnRef>
+          <a:fillRef idx="1">
+            <a:schemeClr val="accent1"/>
+          </a:fillRef>
+          <a:effectRef idx="0">
+            <a:schemeClr val="accent1"/>
+          </a:effectRef>
+          <a:fontRef idx="minor">
+            <a:schemeClr val="lt1"/>
+          </a:fontRef>
+        </p:style>
+        <p:txBody>
+          <a:bodyPr tIns="91440"/>
+          <a:lstStyle/>
+          <a:p>
+            <a:pPr algn="ctr" eaLnBrk="1" fontAlgn="auto" hangingPunct="1">
+              <a:spcBef>
+                <a:spcPts val="0"/>
+              </a:spcBef>
+              <a:spcAft>
+                <a:spcPts val="0"/>
+              </a:spcAft>
+              <a:defRPr/>
+            </a:pPr>
+            <a:r>
+              <a:rPr lang="en-US" sz="1200" smtClean="0">
+                <a:solidFill>
+                  <a:srgbClr val="5A6B86"/>
+                </a:solidFill>
+                <a:latin typeface="Arial" panose="020B0604020202020204" pitchFamily="34" charset="0"/>
+                <a:cs typeface="Arial" panose="020B0604020202020204" pitchFamily="34" charset="0"/>
+              </a:rPr>
+              <a:t>Armory Operator</a:t>
+            </a:r>
+            <a:endParaRPr lang="en-US" sz="1200" dirty="0">
+              <a:solidFill>
+                <a:srgbClr val="5A6B86"/>
+              </a:solidFill>
+              <a:latin typeface="Arial" panose="020B0604020202020204" pitchFamily="34" charset="0"/>
+              <a:cs typeface="Arial" panose="020B0604020202020204" pitchFamily="34" charset="0"/>
+            </a:endParaRPr>
+          </a:p>
+        </p:txBody>
+      </p:sp>
+      <p:sp>
+        <p:nvSpPr>
+          <p:cNvPr id="61" name="TextBox 17">
+            <a:extLst>
+              <a:ext uri="{FF2B5EF4-FFF2-40B4-BE49-F238E27FC236}">
+                <a16:creationId xmlns:a16="http://schemas.microsoft.com/office/drawing/2014/main" id="{D416F419-7FF9-FD42-97EF-0DDC4E5EAB21}"/>
+              </a:ext>
+            </a:extLst>
+          </p:cNvPr>
+          <p:cNvSpPr txBox="1">
+            <a:spLocks noChangeArrowheads="1"/>
+          </p:cNvSpPr>
+          <p:nvPr/>
+        </p:nvSpPr>
+        <p:spPr bwMode="auto">
+          <a:xfrm>
+            <a:off x="2682456" y="6508377"/>
+            <a:ext cx="953920" cy="430887"/>
+          </a:xfrm>
+          <a:prstGeom prst="rect">
+            <a:avLst/>
+          </a:prstGeom>
+          <a:noFill/>
+          <a:ln>
+            <a:noFill/>
+          </a:ln>
+          <a:extLst>
+            <a:ext uri="{909E8E84-426E-40DD-AFC4-6F175D3DCCD1}">
+              <a14:hiddenFill xmlns:a14="http://schemas.microsoft.com/office/drawing/2010/main">
+                <a:solidFill>
+                  <a:srgbClr val="FFFFFF"/>
+                </a:solidFill>
+              </a14:hiddenFill>
+            </a:ext>
+            <a:ext uri="{91240B29-F687-4F45-9708-019B960494DF}">
+              <a14:hiddenLine xmlns:a14="http://schemas.microsoft.com/office/drawing/2010/main" w="9525">
+                <a:solidFill>
+                  <a:srgbClr val="000000"/>
+                </a:solidFill>
+                <a:miter lim="800000"/>
+                <a:headEnd/>
+                <a:tailEnd/>
+              </a14:hiddenLine>
+            </a:ext>
+          </a:extLst>
+        </p:spPr>
+        <p:txBody>
+          <a:bodyPr wrap="square">
+            <a:spAutoFit/>
+          </a:bodyPr>
+          <a:lstStyle>
+            <a:lvl1pPr>
+              <a:defRPr>
+                <a:solidFill>
+                  <a:schemeClr val="tx1"/>
+                </a:solidFill>
+                <a:latin typeface="Calibri" panose="020F0502020204030204" pitchFamily="34" charset="0"/>
+              </a:defRPr>
+            </a:lvl1pPr>
+            <a:lvl2pPr marL="742950" indent="-285750">
+              <a:defRPr>
+                <a:solidFill>
+                  <a:schemeClr val="tx1"/>
+                </a:solidFill>
+                <a:latin typeface="Calibri" panose="020F0502020204030204" pitchFamily="34" charset="0"/>
+              </a:defRPr>
+            </a:lvl2pPr>
+            <a:lvl3pPr marL="1143000" indent="-228600">
+              <a:defRPr>
+                <a:solidFill>
+                  <a:schemeClr val="tx1"/>
+                </a:solidFill>
+                <a:latin typeface="Calibri" panose="020F0502020204030204" pitchFamily="34" charset="0"/>
+              </a:defRPr>
+            </a:lvl3pPr>
+            <a:lvl4pPr marL="1600200" indent="-228600">
+              <a:defRPr>
+                <a:solidFill>
+                  <a:schemeClr val="tx1"/>
+                </a:solidFill>
+                <a:latin typeface="Calibri" panose="020F0502020204030204" pitchFamily="34" charset="0"/>
+              </a:defRPr>
+            </a:lvl4pPr>
+            <a:lvl5pPr marL="2057400" indent="-228600">
+              <a:defRPr>
+                <a:solidFill>
+                  <a:schemeClr val="tx1"/>
+                </a:solidFill>
+                <a:latin typeface="Calibri" panose="020F0502020204030204" pitchFamily="34" charset="0"/>
+              </a:defRPr>
+            </a:lvl5pPr>
+            <a:lvl6pPr marL="2514600" indent="-228600" eaLnBrk="0" fontAlgn="base" hangingPunct="0">
+              <a:spcBef>
+                <a:spcPct val="0"/>
+              </a:spcBef>
+              <a:spcAft>
+                <a:spcPct val="0"/>
+              </a:spcAft>
+              <a:defRPr>
+                <a:solidFill>
+                  <a:schemeClr val="tx1"/>
+                </a:solidFill>
+                <a:latin typeface="Calibri" panose="020F0502020204030204" pitchFamily="34" charset="0"/>
+              </a:defRPr>
+            </a:lvl6pPr>
+            <a:lvl7pPr marL="2971800" indent="-228600" eaLnBrk="0" fontAlgn="base" hangingPunct="0">
+              <a:spcBef>
+                <a:spcPct val="0"/>
+              </a:spcBef>
+              <a:spcAft>
+                <a:spcPct val="0"/>
+              </a:spcAft>
+              <a:defRPr>
+                <a:solidFill>
+                  <a:schemeClr val="tx1"/>
+                </a:solidFill>
+                <a:latin typeface="Calibri" panose="020F0502020204030204" pitchFamily="34" charset="0"/>
+              </a:defRPr>
+            </a:lvl7pPr>
+            <a:lvl8pPr marL="3429000" indent="-228600" eaLnBrk="0" fontAlgn="base" hangingPunct="0">
+              <a:spcBef>
+                <a:spcPct val="0"/>
+              </a:spcBef>
+              <a:spcAft>
+                <a:spcPct val="0"/>
+              </a:spcAft>
+              <a:defRPr>
+                <a:solidFill>
+                  <a:schemeClr val="tx1"/>
+                </a:solidFill>
+                <a:latin typeface="Calibri" panose="020F0502020204030204" pitchFamily="34" charset="0"/>
+              </a:defRPr>
+            </a:lvl8pPr>
+            <a:lvl9pPr marL="3886200" indent="-228600" eaLnBrk="0" fontAlgn="base" hangingPunct="0">
+              <a:spcBef>
+                <a:spcPct val="0"/>
+              </a:spcBef>
+              <a:spcAft>
+                <a:spcPct val="0"/>
+              </a:spcAft>
+              <a:defRPr>
+                <a:solidFill>
+                  <a:schemeClr val="tx1"/>
+                </a:solidFill>
+                <a:latin typeface="Calibri" panose="020F0502020204030204" pitchFamily="34" charset="0"/>
+              </a:defRPr>
+            </a:lvl9pPr>
+          </a:lstStyle>
+          <a:p>
+            <a:pPr algn="ctr" eaLnBrk="1" hangingPunct="1"/>
+            <a:r>
+              <a:rPr lang="en-US" altLang="en-US" sz="1100" smtClean="0">
+                <a:latin typeface="Arial" panose="020B0604020202020204" pitchFamily="34" charset="0"/>
+                <a:ea typeface="Amazon Ember" panose="020B0603020204020204" pitchFamily="34" charset="0"/>
+                <a:cs typeface="Arial" panose="020B0604020202020204" pitchFamily="34" charset="0"/>
+              </a:rPr>
+              <a:t>ElastiCache Redis </a:t>
+            </a:r>
+            <a:r>
+              <a:rPr lang="en-US" altLang="en-US" sz="1100" dirty="0">
+                <a:latin typeface="Arial" panose="020B0604020202020204" pitchFamily="34" charset="0"/>
+                <a:ea typeface="Amazon Ember" panose="020B0603020204020204" pitchFamily="34" charset="0"/>
+                <a:cs typeface="Arial" panose="020B0604020202020204" pitchFamily="34" charset="0"/>
+              </a:rPr>
+              <a:t>node</a:t>
+            </a:r>
+          </a:p>
+        </p:txBody>
+      </p:sp>
+      <p:sp>
+        <p:nvSpPr>
+          <p:cNvPr id="63" name="TextBox 8">
+            <a:extLst>
+              <a:ext uri="{FF2B5EF4-FFF2-40B4-BE49-F238E27FC236}">
+                <a16:creationId xmlns:a16="http://schemas.microsoft.com/office/drawing/2014/main" id="{9A51BFEC-955C-E444-A046-8E4A45B6EFDA}"/>
+              </a:ext>
+            </a:extLst>
+          </p:cNvPr>
+          <p:cNvSpPr txBox="1">
+            <a:spLocks noChangeArrowheads="1"/>
+          </p:cNvSpPr>
+          <p:nvPr/>
+        </p:nvSpPr>
+        <p:spPr bwMode="auto">
+          <a:xfrm>
+            <a:off x="3670935" y="6510528"/>
+            <a:ext cx="801100" cy="430887"/>
+          </a:xfrm>
+          <a:prstGeom prst="rect">
+            <a:avLst/>
+          </a:prstGeom>
+          <a:noFill/>
+          <a:ln>
+            <a:noFill/>
+          </a:ln>
+          <a:extLst>
+            <a:ext uri="{909E8E84-426E-40DD-AFC4-6F175D3DCCD1}">
+              <a14:hiddenFill xmlns:a14="http://schemas.microsoft.com/office/drawing/2010/main">
+                <a:solidFill>
+                  <a:srgbClr val="FFFFFF"/>
+                </a:solidFill>
+              </a14:hiddenFill>
+            </a:ext>
+            <a:ext uri="{91240B29-F687-4F45-9708-019B960494DF}">
+              <a14:hiddenLine xmlns:a14="http://schemas.microsoft.com/office/drawing/2010/main" w="9525">
+                <a:solidFill>
+                  <a:srgbClr val="000000"/>
+                </a:solidFill>
+                <a:miter lim="800000"/>
+                <a:headEnd/>
+                <a:tailEnd/>
+              </a14:hiddenLine>
+            </a:ext>
+          </a:extLst>
+        </p:spPr>
+        <p:txBody>
+          <a:bodyPr wrap="square">
+            <a:spAutoFit/>
+          </a:bodyPr>
+          <a:lstStyle>
+            <a:lvl1pPr>
+              <a:defRPr>
+                <a:solidFill>
+                  <a:schemeClr val="tx1"/>
+                </a:solidFill>
+                <a:latin typeface="Calibri" panose="020F0502020204030204" pitchFamily="34" charset="0"/>
+              </a:defRPr>
+            </a:lvl1pPr>
+            <a:lvl2pPr marL="742950" indent="-285750">
+              <a:defRPr>
+                <a:solidFill>
+                  <a:schemeClr val="tx1"/>
+                </a:solidFill>
+                <a:latin typeface="Calibri" panose="020F0502020204030204" pitchFamily="34" charset="0"/>
+              </a:defRPr>
+            </a:lvl2pPr>
+            <a:lvl3pPr marL="1143000" indent="-228600">
+              <a:defRPr>
+                <a:solidFill>
+                  <a:schemeClr val="tx1"/>
+                </a:solidFill>
+                <a:latin typeface="Calibri" panose="020F0502020204030204" pitchFamily="34" charset="0"/>
+              </a:defRPr>
+            </a:lvl3pPr>
+            <a:lvl4pPr marL="1600200" indent="-228600">
+              <a:defRPr>
+                <a:solidFill>
+                  <a:schemeClr val="tx1"/>
+                </a:solidFill>
+                <a:latin typeface="Calibri" panose="020F0502020204030204" pitchFamily="34" charset="0"/>
+              </a:defRPr>
+            </a:lvl4pPr>
+            <a:lvl5pPr marL="2057400" indent="-228600">
+              <a:defRPr>
+                <a:solidFill>
+                  <a:schemeClr val="tx1"/>
+                </a:solidFill>
+                <a:latin typeface="Calibri" panose="020F0502020204030204" pitchFamily="34" charset="0"/>
+              </a:defRPr>
+            </a:lvl5pPr>
+            <a:lvl6pPr marL="2514600" indent="-228600" eaLnBrk="0" fontAlgn="base" hangingPunct="0">
+              <a:spcBef>
+                <a:spcPct val="0"/>
+              </a:spcBef>
+              <a:spcAft>
+                <a:spcPct val="0"/>
+              </a:spcAft>
+              <a:defRPr>
+                <a:solidFill>
+                  <a:schemeClr val="tx1"/>
+                </a:solidFill>
+                <a:latin typeface="Calibri" panose="020F0502020204030204" pitchFamily="34" charset="0"/>
+              </a:defRPr>
+            </a:lvl6pPr>
+            <a:lvl7pPr marL="2971800" indent="-228600" eaLnBrk="0" fontAlgn="base" hangingPunct="0">
+              <a:spcBef>
+                <a:spcPct val="0"/>
+              </a:spcBef>
+              <a:spcAft>
+                <a:spcPct val="0"/>
+              </a:spcAft>
+              <a:defRPr>
+                <a:solidFill>
+                  <a:schemeClr val="tx1"/>
+                </a:solidFill>
+                <a:latin typeface="Calibri" panose="020F0502020204030204" pitchFamily="34" charset="0"/>
+              </a:defRPr>
+            </a:lvl7pPr>
+            <a:lvl8pPr marL="3429000" indent="-228600" eaLnBrk="0" fontAlgn="base" hangingPunct="0">
+              <a:spcBef>
+                <a:spcPct val="0"/>
+              </a:spcBef>
+              <a:spcAft>
+                <a:spcPct val="0"/>
+              </a:spcAft>
+              <a:defRPr>
+                <a:solidFill>
+                  <a:schemeClr val="tx1"/>
+                </a:solidFill>
+                <a:latin typeface="Calibri" panose="020F0502020204030204" pitchFamily="34" charset="0"/>
+              </a:defRPr>
+            </a:lvl8pPr>
+            <a:lvl9pPr marL="3886200" indent="-228600" eaLnBrk="0" fontAlgn="base" hangingPunct="0">
+              <a:spcBef>
+                <a:spcPct val="0"/>
+              </a:spcBef>
+              <a:spcAft>
+                <a:spcPct val="0"/>
+              </a:spcAft>
+              <a:defRPr>
+                <a:solidFill>
+                  <a:schemeClr val="tx1"/>
+                </a:solidFill>
+                <a:latin typeface="Calibri" panose="020F0502020204030204" pitchFamily="34" charset="0"/>
+              </a:defRPr>
+            </a:lvl9pPr>
+          </a:lstStyle>
+          <a:p>
+            <a:pPr algn="ctr" eaLnBrk="1" hangingPunct="1"/>
+            <a:r>
+              <a:rPr lang="en-US" altLang="en-US" sz="1100" dirty="0">
+                <a:latin typeface="Arial" panose="020B0604020202020204" pitchFamily="34" charset="0"/>
+                <a:ea typeface="Amazon Ember" panose="020B0603020204020204" pitchFamily="34" charset="0"/>
+                <a:cs typeface="Arial" panose="020B0604020202020204" pitchFamily="34" charset="0"/>
+              </a:rPr>
+              <a:t>MySQL</a:t>
+            </a:r>
+          </a:p>
+          <a:p>
+            <a:pPr algn="ctr" eaLnBrk="1" hangingPunct="1"/>
+            <a:r>
+              <a:rPr lang="en-US" altLang="en-US" sz="1100" dirty="0">
+                <a:latin typeface="Arial" panose="020B0604020202020204" pitchFamily="34" charset="0"/>
+                <a:ea typeface="Amazon Ember" panose="020B0603020204020204" pitchFamily="34" charset="0"/>
+                <a:cs typeface="Arial" panose="020B0604020202020204" pitchFamily="34" charset="0"/>
+              </a:rPr>
+              <a:t>instance</a:t>
+            </a:r>
+          </a:p>
+        </p:txBody>
+      </p:sp>
+      <p:pic>
+        <p:nvPicPr>
+          <p:cNvPr id="65" name="Graphic 24">
+            <a:extLst>
+              <a:ext uri="{FF2B5EF4-FFF2-40B4-BE49-F238E27FC236}">
+                <a16:creationId xmlns:a16="http://schemas.microsoft.com/office/drawing/2014/main" id="{1BB1A929-4B62-3040-9466-CB51DB3ACE7D}"/>
+              </a:ext>
+            </a:extLst>
+          </p:cNvPr>
+          <p:cNvPicPr>
+            <a:picLocks noChangeAspect="1" noChangeArrowheads="1"/>
+          </p:cNvPicPr>
+          <p:nvPr/>
+        </p:nvPicPr>
+        <p:blipFill>
+          <a:blip r:embed="rId34">
+            <a:extLst>
+              <a:ext uri="{28A0092B-C50C-407E-A947-70E740481C1C}">
+                <a14:useLocalDpi xmlns:a14="http://schemas.microsoft.com/office/drawing/2010/main" val="0"/>
+              </a:ext>
+            </a:extLst>
+          </a:blip>
+          <a:srcRect/>
+          <a:stretch>
+            <a:fillRect/>
+          </a:stretch>
+        </p:blipFill>
+        <p:spPr bwMode="auto">
+          <a:xfrm>
+            <a:off x="2926080" y="6035040"/>
+            <a:ext cx="457200" cy="457200"/>
+          </a:xfrm>
+          <a:prstGeom prst="rect">
+            <a:avLst/>
+          </a:prstGeom>
+          <a:noFill/>
+          <a:ln>
+            <a:noFill/>
+          </a:ln>
+          <a:extLst>
+            <a:ext uri="{909E8E84-426E-40DD-AFC4-6F175D3DCCD1}">
+              <a14:hiddenFill xmlns:a14="http://schemas.microsoft.com/office/drawing/2010/main">
+                <a:solidFill>
+                  <a:srgbClr val="FFFFFF"/>
+                </a:solidFill>
+              </a14:hiddenFill>
+            </a:ext>
+            <a:ext uri="{91240B29-F687-4F45-9708-019B960494DF}">
+              <a14:hiddenLine xmlns:a14="http://schemas.microsoft.com/office/drawing/2010/main" w="9525">
+                <a:solidFill>
+                  <a:srgbClr val="000000"/>
+                </a:solidFill>
+                <a:miter lim="800000"/>
+                <a:headEnd/>
+                <a:tailEnd/>
+              </a14:hiddenLine>
+            </a:ext>
+          </a:extLst>
+        </p:spPr>
+      </p:pic>
+      <p:sp>
+        <p:nvSpPr>
+          <p:cNvPr id="67" name="Rectangle 66">
+            <a:extLst>
+              <a:ext uri="{FF2B5EF4-FFF2-40B4-BE49-F238E27FC236}">
+                <a16:creationId xmlns:a16="http://schemas.microsoft.com/office/drawing/2014/main" id="{CA9FC015-58A6-074B-8C1E-732DA3337466}"/>
+              </a:ext>
+            </a:extLst>
+          </p:cNvPr>
+          <p:cNvSpPr/>
+          <p:nvPr/>
+        </p:nvSpPr>
+        <p:spPr>
+          <a:xfrm>
+            <a:off x="5852160" y="4389120"/>
+            <a:ext cx="1737360" cy="2651760"/>
+          </a:xfrm>
+          <a:prstGeom prst="rect">
+            <a:avLst/>
+          </a:prstGeom>
+          <a:solidFill>
+            <a:srgbClr val="007CBC">
+              <a:alpha val="9804"/>
+            </a:srgbClr>
+          </a:solidFill>
+          <a:ln w="12700">
+            <a:noFill/>
+            <a:prstDash val="solid"/>
+          </a:ln>
+        </p:spPr>
+        <p:style>
+          <a:lnRef idx="2">
+            <a:schemeClr val="accent1">
+              <a:shade val="50000"/>
+            </a:schemeClr>
+          </a:lnRef>
+          <a:fillRef idx="1">
+            <a:schemeClr val="accent1"/>
+          </a:fillRef>
+          <a:effectRef idx="0">
+            <a:schemeClr val="accent1"/>
+          </a:effectRef>
+          <a:fontRef idx="minor">
+            <a:schemeClr val="lt1"/>
+          </a:fontRef>
+        </p:style>
+        <p:txBody>
+          <a:bodyPr rot="0" spcFirstLastPara="0" vertOverflow="overflow" horzOverflow="overflow" vert="horz" wrap="square" lIns="338328" tIns="45720" rIns="91440" bIns="45720" numCol="1" spcCol="0" rtlCol="0" fromWordArt="0" anchor="t" anchorCtr="0" forceAA="0" compatLnSpc="1">
+            <a:prstTxWarp prst="textNoShape">
+              <a:avLst/>
+            </a:prstTxWarp>
+            <a:noAutofit/>
+          </a:bodyPr>
+          <a:lstStyle/>
+          <a:p>
+            <a:pPr algn="l"/>
+            <a:r>
+              <a:rPr lang="en-US" sz="1200" dirty="0">
+                <a:solidFill>
+                  <a:srgbClr val="007DBC"/>
+                </a:solidFill>
+                <a:latin typeface="Arial" panose="020B0604020202020204" pitchFamily="34" charset="0"/>
+                <a:cs typeface="Arial" panose="020B0604020202020204" pitchFamily="34" charset="0"/>
+              </a:rPr>
+              <a:t>Private subnet</a:t>
+            </a:r>
+          </a:p>
+        </p:txBody>
+      </p:sp>
+      <p:sp>
+        <p:nvSpPr>
+          <p:cNvPr id="68" name="TextBox 67">
+            <a:extLst>
+              <a:ext uri="{FF2B5EF4-FFF2-40B4-BE49-F238E27FC236}">
+                <a16:creationId xmlns:a16="http://schemas.microsoft.com/office/drawing/2014/main" id="{BB0FED51-F4D8-A643-8438-DC2ADE8AA465}"/>
+              </a:ext>
+            </a:extLst>
+          </p:cNvPr>
+          <p:cNvSpPr txBox="1"/>
+          <p:nvPr/>
+        </p:nvSpPr>
+        <p:spPr>
+          <a:xfrm>
+            <a:off x="6002237" y="5404485"/>
+            <a:ext cx="1440910" cy="276999"/>
+          </a:xfrm>
+          <a:prstGeom prst="rect">
+            <a:avLst/>
+          </a:prstGeom>
+          <a:noFill/>
+        </p:spPr>
+        <p:txBody>
+          <a:bodyPr wrap="square" rtlCol="0" anchor="t">
+            <a:spAutoFit/>
+          </a:bodyPr>
+          <a:lstStyle/>
+          <a:p>
+            <a:pPr algn="ctr"/>
+            <a:r>
+              <a:rPr lang="en-US" sz="1200" dirty="0">
+                <a:latin typeface="Arial" panose="020B0604020202020204" pitchFamily="34" charset="0"/>
+                <a:cs typeface="Arial" panose="020B0604020202020204" pitchFamily="34" charset="0"/>
+              </a:rPr>
+              <a:t>Kubernetes nodes</a:t>
+            </a:r>
+          </a:p>
+        </p:txBody>
+      </p:sp>
+      <p:pic>
+        <p:nvPicPr>
+          <p:cNvPr id="69" name="Graphic 62">
+            <a:extLst>
+              <a:ext uri="{FF2B5EF4-FFF2-40B4-BE49-F238E27FC236}">
+                <a16:creationId xmlns:a16="http://schemas.microsoft.com/office/drawing/2014/main" id="{8B47AFFF-81D9-C348-90A5-553E82D08748}"/>
+              </a:ext>
+            </a:extLst>
+          </p:cNvPr>
+          <p:cNvPicPr>
+            <a:picLocks noChangeAspect="1" noChangeArrowheads="1"/>
+          </p:cNvPicPr>
+          <p:nvPr/>
+        </p:nvPicPr>
+        <p:blipFill>
+          <a:blip r:embed="rId29">
+            <a:extLst>
+              <a:ext uri="{28A0092B-C50C-407E-A947-70E740481C1C}">
+                <a14:useLocalDpi xmlns:a14="http://schemas.microsoft.com/office/drawing/2010/main" val="0"/>
+              </a:ext>
+            </a:extLst>
+          </a:blip>
+          <a:srcRect/>
+          <a:stretch>
+            <a:fillRect/>
+          </a:stretch>
+        </p:blipFill>
+        <p:spPr bwMode="auto">
+          <a:xfrm>
+            <a:off x="6492240" y="4937760"/>
+            <a:ext cx="457200" cy="457200"/>
+          </a:xfrm>
+          <a:prstGeom prst="rect">
+            <a:avLst/>
+          </a:prstGeom>
+          <a:noFill/>
+          <a:ln>
+            <a:noFill/>
+          </a:ln>
+          <a:extLst>
+            <a:ext uri="{909E8E84-426E-40DD-AFC4-6F175D3DCCD1}">
+              <a14:hiddenFill xmlns:a14="http://schemas.microsoft.com/office/drawing/2010/main">
+                <a:solidFill>
+                  <a:srgbClr val="FFFFFF"/>
+                </a:solidFill>
+              </a14:hiddenFill>
+            </a:ext>
+            <a:ext uri="{91240B29-F687-4F45-9708-019B960494DF}">
+              <a14:hiddenLine xmlns:a14="http://schemas.microsoft.com/office/drawing/2010/main" w="9525">
+                <a:solidFill>
+                  <a:srgbClr val="000000"/>
+                </a:solidFill>
+                <a:miter lim="800000"/>
+                <a:headEnd/>
+                <a:tailEnd/>
+              </a14:hiddenLine>
+            </a:ext>
+          </a:extLst>
+        </p:spPr>
+      </p:pic>
+      <p:pic>
+        <p:nvPicPr>
+          <p:cNvPr id="70" name="Graphic 35">
+            <a:extLst>
+              <a:ext uri="{FF2B5EF4-FFF2-40B4-BE49-F238E27FC236}">
+                <a16:creationId xmlns:a16="http://schemas.microsoft.com/office/drawing/2014/main" id="{6FC3D56A-1081-9B43-9B9C-251CDE8593F4}"/>
+              </a:ext>
+            </a:extLst>
+          </p:cNvPr>
+          <p:cNvPicPr>
+            <a:picLocks noChangeAspect="1" noChangeArrowheads="1"/>
+          </p:cNvPicPr>
+          <p:nvPr/>
+        </p:nvPicPr>
+        <p:blipFill>
+          <a:blip r:embed="rId31">
+            <a:extLst>
+              <a:ext uri="{28A0092B-C50C-407E-A947-70E740481C1C}">
+                <a14:useLocalDpi xmlns:a14="http://schemas.microsoft.com/office/drawing/2010/main" val="0"/>
+              </a:ext>
+            </a:extLst>
+          </a:blip>
+          <a:srcRect/>
+          <a:stretch>
+            <a:fillRect/>
+          </a:stretch>
+        </p:blipFill>
+        <p:spPr bwMode="auto">
+          <a:xfrm>
+            <a:off x="5852160" y="4389120"/>
+            <a:ext cx="274637" cy="274638"/>
+          </a:xfrm>
+          <a:prstGeom prst="rect">
+            <a:avLst/>
+          </a:prstGeom>
+          <a:noFill/>
+          <a:ln>
+            <a:noFill/>
+          </a:ln>
+          <a:extLst>
+            <a:ext uri="{909E8E84-426E-40DD-AFC4-6F175D3DCCD1}">
+              <a14:hiddenFill xmlns:a14="http://schemas.microsoft.com/office/drawing/2010/main">
+                <a:solidFill>
+                  <a:srgbClr val="FFFFFF"/>
+                </a:solidFill>
+              </a14:hiddenFill>
+            </a:ext>
+            <a:ext uri="{91240B29-F687-4F45-9708-019B960494DF}">
+              <a14:hiddenLine xmlns:a14="http://schemas.microsoft.com/office/drawing/2010/main" w="9525">
+                <a:solidFill>
+                  <a:srgbClr val="000000"/>
+                </a:solidFill>
+                <a:miter lim="800000"/>
+                <a:headEnd/>
+                <a:tailEnd/>
+              </a14:hiddenLine>
+            </a:ext>
+          </a:extLst>
+        </p:spPr>
+      </p:pic>
+      <p:sp>
+        <p:nvSpPr>
+          <p:cNvPr id="78" name="TextBox 17">
+            <a:extLst>
+              <a:ext uri="{FF2B5EF4-FFF2-40B4-BE49-F238E27FC236}">
+                <a16:creationId xmlns:a16="http://schemas.microsoft.com/office/drawing/2014/main" id="{D416F419-7FF9-FD42-97EF-0DDC4E5EAB21}"/>
+              </a:ext>
+            </a:extLst>
+          </p:cNvPr>
+          <p:cNvSpPr txBox="1">
+            <a:spLocks noChangeArrowheads="1"/>
+          </p:cNvSpPr>
+          <p:nvPr/>
+        </p:nvSpPr>
+        <p:spPr bwMode="auto">
+          <a:xfrm>
+            <a:off x="5787188" y="6508377"/>
+            <a:ext cx="953920" cy="430887"/>
+          </a:xfrm>
+          <a:prstGeom prst="rect">
+            <a:avLst/>
+          </a:prstGeom>
+          <a:noFill/>
+          <a:ln>
+            <a:noFill/>
+          </a:ln>
+          <a:extLst>
+            <a:ext uri="{909E8E84-426E-40DD-AFC4-6F175D3DCCD1}">
+              <a14:hiddenFill xmlns:a14="http://schemas.microsoft.com/office/drawing/2010/main">
+                <a:solidFill>
+                  <a:srgbClr val="FFFFFF"/>
+                </a:solidFill>
+              </a14:hiddenFill>
+            </a:ext>
+            <a:ext uri="{91240B29-F687-4F45-9708-019B960494DF}">
+              <a14:hiddenLine xmlns:a14="http://schemas.microsoft.com/office/drawing/2010/main" w="9525">
+                <a:solidFill>
+                  <a:srgbClr val="000000"/>
+                </a:solidFill>
+                <a:miter lim="800000"/>
+                <a:headEnd/>
+                <a:tailEnd/>
+              </a14:hiddenLine>
+            </a:ext>
+          </a:extLst>
+        </p:spPr>
+        <p:txBody>
+          <a:bodyPr wrap="square">
+            <a:spAutoFit/>
+          </a:bodyPr>
+          <a:lstStyle>
+            <a:lvl1pPr>
+              <a:defRPr>
+                <a:solidFill>
+                  <a:schemeClr val="tx1"/>
+                </a:solidFill>
+                <a:latin typeface="Calibri" panose="020F0502020204030204" pitchFamily="34" charset="0"/>
+              </a:defRPr>
+            </a:lvl1pPr>
+            <a:lvl2pPr marL="742950" indent="-285750">
+              <a:defRPr>
+                <a:solidFill>
+                  <a:schemeClr val="tx1"/>
+                </a:solidFill>
+                <a:latin typeface="Calibri" panose="020F0502020204030204" pitchFamily="34" charset="0"/>
+              </a:defRPr>
+            </a:lvl2pPr>
+            <a:lvl3pPr marL="1143000" indent="-228600">
+              <a:defRPr>
+                <a:solidFill>
+                  <a:schemeClr val="tx1"/>
+                </a:solidFill>
+                <a:latin typeface="Calibri" panose="020F0502020204030204" pitchFamily="34" charset="0"/>
+              </a:defRPr>
+            </a:lvl3pPr>
+            <a:lvl4pPr marL="1600200" indent="-228600">
+              <a:defRPr>
+                <a:solidFill>
+                  <a:schemeClr val="tx1"/>
+                </a:solidFill>
+                <a:latin typeface="Calibri" panose="020F0502020204030204" pitchFamily="34" charset="0"/>
+              </a:defRPr>
+            </a:lvl4pPr>
+            <a:lvl5pPr marL="2057400" indent="-228600">
+              <a:defRPr>
+                <a:solidFill>
+                  <a:schemeClr val="tx1"/>
+                </a:solidFill>
+                <a:latin typeface="Calibri" panose="020F0502020204030204" pitchFamily="34" charset="0"/>
+              </a:defRPr>
+            </a:lvl5pPr>
+            <a:lvl6pPr marL="2514600" indent="-228600" eaLnBrk="0" fontAlgn="base" hangingPunct="0">
+              <a:spcBef>
+                <a:spcPct val="0"/>
+              </a:spcBef>
+              <a:spcAft>
+                <a:spcPct val="0"/>
+              </a:spcAft>
+              <a:defRPr>
+                <a:solidFill>
+                  <a:schemeClr val="tx1"/>
+                </a:solidFill>
+                <a:latin typeface="Calibri" panose="020F0502020204030204" pitchFamily="34" charset="0"/>
+              </a:defRPr>
+            </a:lvl6pPr>
+            <a:lvl7pPr marL="2971800" indent="-228600" eaLnBrk="0" fontAlgn="base" hangingPunct="0">
+              <a:spcBef>
+                <a:spcPct val="0"/>
+              </a:spcBef>
+              <a:spcAft>
+                <a:spcPct val="0"/>
+              </a:spcAft>
+              <a:defRPr>
+                <a:solidFill>
+                  <a:schemeClr val="tx1"/>
+                </a:solidFill>
+                <a:latin typeface="Calibri" panose="020F0502020204030204" pitchFamily="34" charset="0"/>
+              </a:defRPr>
+            </a:lvl7pPr>
+            <a:lvl8pPr marL="3429000" indent="-228600" eaLnBrk="0" fontAlgn="base" hangingPunct="0">
+              <a:spcBef>
+                <a:spcPct val="0"/>
+              </a:spcBef>
+              <a:spcAft>
+                <a:spcPct val="0"/>
+              </a:spcAft>
+              <a:defRPr>
+                <a:solidFill>
+                  <a:schemeClr val="tx1"/>
+                </a:solidFill>
+                <a:latin typeface="Calibri" panose="020F0502020204030204" pitchFamily="34" charset="0"/>
+              </a:defRPr>
+            </a:lvl8pPr>
+            <a:lvl9pPr marL="3886200" indent="-228600" eaLnBrk="0" fontAlgn="base" hangingPunct="0">
+              <a:spcBef>
+                <a:spcPct val="0"/>
+              </a:spcBef>
+              <a:spcAft>
+                <a:spcPct val="0"/>
+              </a:spcAft>
+              <a:defRPr>
+                <a:solidFill>
+                  <a:schemeClr val="tx1"/>
+                </a:solidFill>
+                <a:latin typeface="Calibri" panose="020F0502020204030204" pitchFamily="34" charset="0"/>
+              </a:defRPr>
+            </a:lvl9pPr>
+          </a:lstStyle>
+          <a:p>
+            <a:pPr algn="ctr" eaLnBrk="1" hangingPunct="1"/>
+            <a:r>
+              <a:rPr lang="en-US" altLang="en-US" sz="1100" smtClean="0">
+                <a:latin typeface="Arial" panose="020B0604020202020204" pitchFamily="34" charset="0"/>
+                <a:ea typeface="Amazon Ember" panose="020B0603020204020204" pitchFamily="34" charset="0"/>
+                <a:cs typeface="Arial" panose="020B0604020202020204" pitchFamily="34" charset="0"/>
+              </a:rPr>
+              <a:t>ElastiCache Redis </a:t>
+            </a:r>
+            <a:r>
+              <a:rPr lang="en-US" altLang="en-US" sz="1100" dirty="0">
+                <a:latin typeface="Arial" panose="020B0604020202020204" pitchFamily="34" charset="0"/>
+                <a:ea typeface="Amazon Ember" panose="020B0603020204020204" pitchFamily="34" charset="0"/>
+                <a:cs typeface="Arial" panose="020B0604020202020204" pitchFamily="34" charset="0"/>
+              </a:rPr>
+              <a:t>node</a:t>
+            </a:r>
+          </a:p>
+        </p:txBody>
+      </p:sp>
+      <p:sp>
+        <p:nvSpPr>
+          <p:cNvPr id="79" name="TextBox 8">
+            <a:extLst>
+              <a:ext uri="{FF2B5EF4-FFF2-40B4-BE49-F238E27FC236}">
+                <a16:creationId xmlns:a16="http://schemas.microsoft.com/office/drawing/2014/main" id="{9A51BFEC-955C-E444-A046-8E4A45B6EFDA}"/>
+              </a:ext>
+            </a:extLst>
+          </p:cNvPr>
+          <p:cNvSpPr txBox="1">
+            <a:spLocks noChangeArrowheads="1"/>
+          </p:cNvSpPr>
+          <p:nvPr/>
+        </p:nvSpPr>
+        <p:spPr bwMode="auto">
+          <a:xfrm>
+            <a:off x="6775667" y="6510528"/>
+            <a:ext cx="801100" cy="430887"/>
+          </a:xfrm>
+          <a:prstGeom prst="rect">
+            <a:avLst/>
+          </a:prstGeom>
+          <a:noFill/>
+          <a:ln>
+            <a:noFill/>
+          </a:ln>
+          <a:extLst>
+            <a:ext uri="{909E8E84-426E-40DD-AFC4-6F175D3DCCD1}">
+              <a14:hiddenFill xmlns:a14="http://schemas.microsoft.com/office/drawing/2010/main">
+                <a:solidFill>
+                  <a:srgbClr val="FFFFFF"/>
+                </a:solidFill>
+              </a14:hiddenFill>
+            </a:ext>
+            <a:ext uri="{91240B29-F687-4F45-9708-019B960494DF}">
+              <a14:hiddenLine xmlns:a14="http://schemas.microsoft.com/office/drawing/2010/main" w="9525">
+                <a:solidFill>
+                  <a:srgbClr val="000000"/>
+                </a:solidFill>
+                <a:miter lim="800000"/>
+                <a:headEnd/>
+                <a:tailEnd/>
+              </a14:hiddenLine>
+            </a:ext>
+          </a:extLst>
+        </p:spPr>
+        <p:txBody>
+          <a:bodyPr wrap="square">
+            <a:spAutoFit/>
+          </a:bodyPr>
+          <a:lstStyle>
+            <a:lvl1pPr>
+              <a:defRPr>
+                <a:solidFill>
+                  <a:schemeClr val="tx1"/>
+                </a:solidFill>
+                <a:latin typeface="Calibri" panose="020F0502020204030204" pitchFamily="34" charset="0"/>
+              </a:defRPr>
+            </a:lvl1pPr>
+            <a:lvl2pPr marL="742950" indent="-285750">
+              <a:defRPr>
+                <a:solidFill>
+                  <a:schemeClr val="tx1"/>
+                </a:solidFill>
+                <a:latin typeface="Calibri" panose="020F0502020204030204" pitchFamily="34" charset="0"/>
+              </a:defRPr>
+            </a:lvl2pPr>
+            <a:lvl3pPr marL="1143000" indent="-228600">
+              <a:defRPr>
+                <a:solidFill>
+                  <a:schemeClr val="tx1"/>
+                </a:solidFill>
+                <a:latin typeface="Calibri" panose="020F0502020204030204" pitchFamily="34" charset="0"/>
+              </a:defRPr>
+            </a:lvl3pPr>
+            <a:lvl4pPr marL="1600200" indent="-228600">
+              <a:defRPr>
+                <a:solidFill>
+                  <a:schemeClr val="tx1"/>
+                </a:solidFill>
+                <a:latin typeface="Calibri" panose="020F0502020204030204" pitchFamily="34" charset="0"/>
+              </a:defRPr>
+            </a:lvl4pPr>
+            <a:lvl5pPr marL="2057400" indent="-228600">
+              <a:defRPr>
+                <a:solidFill>
+                  <a:schemeClr val="tx1"/>
+                </a:solidFill>
+                <a:latin typeface="Calibri" panose="020F0502020204030204" pitchFamily="34" charset="0"/>
+              </a:defRPr>
+            </a:lvl5pPr>
+            <a:lvl6pPr marL="2514600" indent="-228600" eaLnBrk="0" fontAlgn="base" hangingPunct="0">
+              <a:spcBef>
+                <a:spcPct val="0"/>
+              </a:spcBef>
+              <a:spcAft>
+                <a:spcPct val="0"/>
+              </a:spcAft>
+              <a:defRPr>
+                <a:solidFill>
+                  <a:schemeClr val="tx1"/>
+                </a:solidFill>
+                <a:latin typeface="Calibri" panose="020F0502020204030204" pitchFamily="34" charset="0"/>
+              </a:defRPr>
+            </a:lvl6pPr>
+            <a:lvl7pPr marL="2971800" indent="-228600" eaLnBrk="0" fontAlgn="base" hangingPunct="0">
+              <a:spcBef>
+                <a:spcPct val="0"/>
+              </a:spcBef>
+              <a:spcAft>
+                <a:spcPct val="0"/>
+              </a:spcAft>
+              <a:defRPr>
+                <a:solidFill>
+                  <a:schemeClr val="tx1"/>
+                </a:solidFill>
+                <a:latin typeface="Calibri" panose="020F0502020204030204" pitchFamily="34" charset="0"/>
+              </a:defRPr>
+            </a:lvl7pPr>
+            <a:lvl8pPr marL="3429000" indent="-228600" eaLnBrk="0" fontAlgn="base" hangingPunct="0">
+              <a:spcBef>
+                <a:spcPct val="0"/>
+              </a:spcBef>
+              <a:spcAft>
+                <a:spcPct val="0"/>
+              </a:spcAft>
+              <a:defRPr>
+                <a:solidFill>
+                  <a:schemeClr val="tx1"/>
+                </a:solidFill>
+                <a:latin typeface="Calibri" panose="020F0502020204030204" pitchFamily="34" charset="0"/>
+              </a:defRPr>
+            </a:lvl8pPr>
+            <a:lvl9pPr marL="3886200" indent="-228600" eaLnBrk="0" fontAlgn="base" hangingPunct="0">
+              <a:spcBef>
+                <a:spcPct val="0"/>
+              </a:spcBef>
+              <a:spcAft>
+                <a:spcPct val="0"/>
+              </a:spcAft>
+              <a:defRPr>
+                <a:solidFill>
+                  <a:schemeClr val="tx1"/>
+                </a:solidFill>
+                <a:latin typeface="Calibri" panose="020F0502020204030204" pitchFamily="34" charset="0"/>
+              </a:defRPr>
+            </a:lvl9pPr>
+          </a:lstStyle>
+          <a:p>
+            <a:pPr algn="ctr" eaLnBrk="1" hangingPunct="1"/>
+            <a:r>
+              <a:rPr lang="en-US" altLang="en-US" sz="1100" dirty="0">
+                <a:latin typeface="Arial" panose="020B0604020202020204" pitchFamily="34" charset="0"/>
+                <a:ea typeface="Amazon Ember" panose="020B0603020204020204" pitchFamily="34" charset="0"/>
+                <a:cs typeface="Arial" panose="020B0604020202020204" pitchFamily="34" charset="0"/>
+              </a:rPr>
+              <a:t>MySQL</a:t>
+            </a:r>
+          </a:p>
+          <a:p>
+            <a:pPr algn="ctr" eaLnBrk="1" hangingPunct="1"/>
+            <a:r>
+              <a:rPr lang="en-US" altLang="en-US" sz="1100" dirty="0">
+                <a:latin typeface="Arial" panose="020B0604020202020204" pitchFamily="34" charset="0"/>
+                <a:ea typeface="Amazon Ember" panose="020B0603020204020204" pitchFamily="34" charset="0"/>
+                <a:cs typeface="Arial" panose="020B0604020202020204" pitchFamily="34" charset="0"/>
+              </a:rPr>
+              <a:t>instance</a:t>
+            </a:r>
+          </a:p>
+        </p:txBody>
+      </p:sp>
+      <p:pic>
+        <p:nvPicPr>
+          <p:cNvPr id="85" name="Graphic 24">
+            <a:extLst>
+              <a:ext uri="{FF2B5EF4-FFF2-40B4-BE49-F238E27FC236}">
+                <a16:creationId xmlns:a16="http://schemas.microsoft.com/office/drawing/2014/main" id="{1BB1A929-4B62-3040-9466-CB51DB3ACE7D}"/>
+              </a:ext>
+            </a:extLst>
+          </p:cNvPr>
+          <p:cNvPicPr>
+            <a:picLocks noChangeAspect="1" noChangeArrowheads="1"/>
+          </p:cNvPicPr>
+          <p:nvPr/>
+        </p:nvPicPr>
+        <p:blipFill>
+          <a:blip r:embed="rId34">
+            <a:extLst>
+              <a:ext uri="{28A0092B-C50C-407E-A947-70E740481C1C}">
+                <a14:useLocalDpi xmlns:a14="http://schemas.microsoft.com/office/drawing/2010/main" val="0"/>
+              </a:ext>
+            </a:extLst>
+          </a:blip>
+          <a:srcRect/>
+          <a:stretch>
+            <a:fillRect/>
+          </a:stretch>
+        </p:blipFill>
+        <p:spPr bwMode="auto">
+          <a:xfrm>
+            <a:off x="6035040" y="6035040"/>
+            <a:ext cx="457200" cy="457200"/>
+          </a:xfrm>
+          <a:prstGeom prst="rect">
+            <a:avLst/>
+          </a:prstGeom>
+          <a:noFill/>
+          <a:ln>
+            <a:noFill/>
+          </a:ln>
+          <a:extLst>
+            <a:ext uri="{909E8E84-426E-40DD-AFC4-6F175D3DCCD1}">
+              <a14:hiddenFill xmlns:a14="http://schemas.microsoft.com/office/drawing/2010/main">
+                <a:solidFill>
+                  <a:srgbClr val="FFFFFF"/>
+                </a:solidFill>
+              </a14:hiddenFill>
+            </a:ext>
+            <a:ext uri="{91240B29-F687-4F45-9708-019B960494DF}">
+              <a14:hiddenLine xmlns:a14="http://schemas.microsoft.com/office/drawing/2010/main" w="9525">
+                <a:solidFill>
+                  <a:srgbClr val="000000"/>
+                </a:solidFill>
+                <a:miter lim="800000"/>
+                <a:headEnd/>
+                <a:tailEnd/>
+              </a14:hiddenLine>
+            </a:ext>
+          </a:extLst>
+        </p:spPr>
+      </p:pic>
+      <p:sp>
+        <p:nvSpPr>
+          <p:cNvPr id="87" name="Rectangle 86">
+            <a:extLst>
+              <a:ext uri="{FF2B5EF4-FFF2-40B4-BE49-F238E27FC236}">
+                <a16:creationId xmlns:a16="http://schemas.microsoft.com/office/drawing/2014/main" id="{CA9FC015-58A6-074B-8C1E-732DA3337466}"/>
+              </a:ext>
+            </a:extLst>
+          </p:cNvPr>
+          <p:cNvSpPr/>
+          <p:nvPr/>
+        </p:nvSpPr>
+        <p:spPr>
+          <a:xfrm>
+            <a:off x="8153508" y="4391799"/>
+            <a:ext cx="1737360" cy="2651760"/>
+          </a:xfrm>
+          <a:prstGeom prst="rect">
+            <a:avLst/>
+          </a:prstGeom>
+          <a:solidFill>
+            <a:srgbClr val="007CBC">
+              <a:alpha val="9804"/>
+            </a:srgbClr>
+          </a:solidFill>
+          <a:ln w="12700">
+            <a:noFill/>
+            <a:prstDash val="solid"/>
+          </a:ln>
+        </p:spPr>
+        <p:style>
+          <a:lnRef idx="2">
+            <a:schemeClr val="accent1">
+              <a:shade val="50000"/>
+            </a:schemeClr>
+          </a:lnRef>
+          <a:fillRef idx="1">
+            <a:schemeClr val="accent1"/>
+          </a:fillRef>
+          <a:effectRef idx="0">
+            <a:schemeClr val="accent1"/>
+          </a:effectRef>
+          <a:fontRef idx="minor">
+            <a:schemeClr val="lt1"/>
+          </a:fontRef>
+        </p:style>
+        <p:txBody>
+          <a:bodyPr rot="0" spcFirstLastPara="0" vertOverflow="overflow" horzOverflow="overflow" vert="horz" wrap="square" lIns="338328" tIns="45720" rIns="91440" bIns="45720" numCol="1" spcCol="0" rtlCol="0" fromWordArt="0" anchor="t" anchorCtr="0" forceAA="0" compatLnSpc="1">
+            <a:prstTxWarp prst="textNoShape">
+              <a:avLst/>
+            </a:prstTxWarp>
+            <a:noAutofit/>
+          </a:bodyPr>
+          <a:lstStyle/>
+          <a:p>
+            <a:pPr algn="l"/>
+            <a:r>
+              <a:rPr lang="en-US" sz="1200" dirty="0">
+                <a:solidFill>
+                  <a:srgbClr val="007DBC"/>
+                </a:solidFill>
+                <a:latin typeface="Arial" panose="020B0604020202020204" pitchFamily="34" charset="0"/>
+                <a:cs typeface="Arial" panose="020B0604020202020204" pitchFamily="34" charset="0"/>
+              </a:rPr>
+              <a:t>Private subnet</a:t>
+            </a:r>
+          </a:p>
+        </p:txBody>
+      </p:sp>
+      <p:sp>
+        <p:nvSpPr>
+          <p:cNvPr id="89" name="TextBox 88">
+            <a:extLst>
+              <a:ext uri="{FF2B5EF4-FFF2-40B4-BE49-F238E27FC236}">
+                <a16:creationId xmlns:a16="http://schemas.microsoft.com/office/drawing/2014/main" id="{BB0FED51-F4D8-A643-8438-DC2ADE8AA465}"/>
+              </a:ext>
+            </a:extLst>
+          </p:cNvPr>
+          <p:cNvSpPr txBox="1"/>
+          <p:nvPr/>
+        </p:nvSpPr>
+        <p:spPr>
+          <a:xfrm>
+            <a:off x="8288763" y="5407164"/>
+            <a:ext cx="1440910" cy="276999"/>
+          </a:xfrm>
+          <a:prstGeom prst="rect">
+            <a:avLst/>
+          </a:prstGeom>
+          <a:noFill/>
+        </p:spPr>
+        <p:txBody>
+          <a:bodyPr wrap="square" rtlCol="0" anchor="t">
+            <a:spAutoFit/>
+          </a:bodyPr>
+          <a:lstStyle/>
+          <a:p>
+            <a:pPr algn="ctr"/>
+            <a:r>
+              <a:rPr lang="en-US" sz="1200" dirty="0">
+                <a:latin typeface="Arial" panose="020B0604020202020204" pitchFamily="34" charset="0"/>
+                <a:cs typeface="Arial" panose="020B0604020202020204" pitchFamily="34" charset="0"/>
+              </a:rPr>
+              <a:t>Kubernetes nodes</a:t>
+            </a:r>
+          </a:p>
+        </p:txBody>
+      </p:sp>
+      <p:pic>
+        <p:nvPicPr>
+          <p:cNvPr id="92" name="Graphic 62">
+            <a:extLst>
+              <a:ext uri="{FF2B5EF4-FFF2-40B4-BE49-F238E27FC236}">
+                <a16:creationId xmlns:a16="http://schemas.microsoft.com/office/drawing/2014/main" id="{8B47AFFF-81D9-C348-90A5-553E82D08748}"/>
+              </a:ext>
+            </a:extLst>
+          </p:cNvPr>
+          <p:cNvPicPr>
+            <a:picLocks noChangeAspect="1" noChangeArrowheads="1"/>
+          </p:cNvPicPr>
+          <p:nvPr/>
+        </p:nvPicPr>
+        <p:blipFill>
+          <a:blip r:embed="rId29">
+            <a:extLst>
+              <a:ext uri="{28A0092B-C50C-407E-A947-70E740481C1C}">
+                <a14:useLocalDpi xmlns:a14="http://schemas.microsoft.com/office/drawing/2010/main" val="0"/>
+              </a:ext>
+            </a:extLst>
+          </a:blip>
+          <a:srcRect/>
+          <a:stretch>
+            <a:fillRect/>
+          </a:stretch>
+        </p:blipFill>
+        <p:spPr bwMode="auto">
+          <a:xfrm>
+            <a:off x="8778240" y="4940439"/>
+            <a:ext cx="457200" cy="457200"/>
+          </a:xfrm>
+          <a:prstGeom prst="rect">
+            <a:avLst/>
+          </a:prstGeom>
+          <a:noFill/>
+          <a:ln>
+            <a:noFill/>
+          </a:ln>
+          <a:extLst>
+            <a:ext uri="{909E8E84-426E-40DD-AFC4-6F175D3DCCD1}">
+              <a14:hiddenFill xmlns:a14="http://schemas.microsoft.com/office/drawing/2010/main">
+                <a:solidFill>
+                  <a:srgbClr val="FFFFFF"/>
+                </a:solidFill>
+              </a14:hiddenFill>
+            </a:ext>
+            <a:ext uri="{91240B29-F687-4F45-9708-019B960494DF}">
+              <a14:hiddenLine xmlns:a14="http://schemas.microsoft.com/office/drawing/2010/main" w="9525">
+                <a:solidFill>
+                  <a:srgbClr val="000000"/>
+                </a:solidFill>
+                <a:miter lim="800000"/>
+                <a:headEnd/>
+                <a:tailEnd/>
+              </a14:hiddenLine>
+            </a:ext>
+          </a:extLst>
+        </p:spPr>
+      </p:pic>
+      <p:pic>
+        <p:nvPicPr>
+          <p:cNvPr id="94" name="Graphic 35">
+            <a:extLst>
+              <a:ext uri="{FF2B5EF4-FFF2-40B4-BE49-F238E27FC236}">
+                <a16:creationId xmlns:a16="http://schemas.microsoft.com/office/drawing/2014/main" id="{6FC3D56A-1081-9B43-9B9C-251CDE8593F4}"/>
+              </a:ext>
+            </a:extLst>
+          </p:cNvPr>
+          <p:cNvPicPr>
+            <a:picLocks noChangeAspect="1" noChangeArrowheads="1"/>
+          </p:cNvPicPr>
+          <p:nvPr/>
+        </p:nvPicPr>
+        <p:blipFill>
+          <a:blip r:embed="rId31">
+            <a:extLst>
+              <a:ext uri="{28A0092B-C50C-407E-A947-70E740481C1C}">
+                <a14:useLocalDpi xmlns:a14="http://schemas.microsoft.com/office/drawing/2010/main" val="0"/>
+              </a:ext>
+            </a:extLst>
+          </a:blip>
+          <a:srcRect/>
+          <a:stretch>
+            <a:fillRect/>
+          </a:stretch>
+        </p:blipFill>
+        <p:spPr bwMode="auto">
+          <a:xfrm>
+            <a:off x="8153508" y="4391799"/>
+            <a:ext cx="274637" cy="274638"/>
+          </a:xfrm>
+          <a:prstGeom prst="rect">
+            <a:avLst/>
+          </a:prstGeom>
+          <a:noFill/>
+          <a:ln>
+            <a:noFill/>
+          </a:ln>
+          <a:extLst>
+            <a:ext uri="{909E8E84-426E-40DD-AFC4-6F175D3DCCD1}">
+              <a14:hiddenFill xmlns:a14="http://schemas.microsoft.com/office/drawing/2010/main">
+                <a:solidFill>
+                  <a:srgbClr val="FFFFFF"/>
+                </a:solidFill>
+              </a14:hiddenFill>
+            </a:ext>
+            <a:ext uri="{91240B29-F687-4F45-9708-019B960494DF}">
+              <a14:hiddenLine xmlns:a14="http://schemas.microsoft.com/office/drawing/2010/main" w="9525">
+                <a:solidFill>
+                  <a:srgbClr val="000000"/>
+                </a:solidFill>
+                <a:miter lim="800000"/>
+                <a:headEnd/>
+                <a:tailEnd/>
+              </a14:hiddenLine>
+            </a:ext>
+          </a:extLst>
+        </p:spPr>
+      </p:pic>
+      <p:sp>
+        <p:nvSpPr>
+          <p:cNvPr id="98" name="TextBox 17">
+            <a:extLst>
+              <a:ext uri="{FF2B5EF4-FFF2-40B4-BE49-F238E27FC236}">
+                <a16:creationId xmlns:a16="http://schemas.microsoft.com/office/drawing/2014/main" id="{D416F419-7FF9-FD42-97EF-0DDC4E5EAB21}"/>
+              </a:ext>
+            </a:extLst>
+          </p:cNvPr>
+          <p:cNvSpPr txBox="1">
+            <a:spLocks noChangeArrowheads="1"/>
+          </p:cNvSpPr>
+          <p:nvPr/>
+        </p:nvSpPr>
+        <p:spPr bwMode="auto">
+          <a:xfrm>
+            <a:off x="8073714" y="6511056"/>
+            <a:ext cx="953920" cy="430887"/>
+          </a:xfrm>
+          <a:prstGeom prst="rect">
+            <a:avLst/>
+          </a:prstGeom>
+          <a:noFill/>
+          <a:ln>
+            <a:noFill/>
+          </a:ln>
+          <a:extLst>
+            <a:ext uri="{909E8E84-426E-40DD-AFC4-6F175D3DCCD1}">
+              <a14:hiddenFill xmlns:a14="http://schemas.microsoft.com/office/drawing/2010/main">
+                <a:solidFill>
+                  <a:srgbClr val="FFFFFF"/>
+                </a:solidFill>
+              </a14:hiddenFill>
+            </a:ext>
+            <a:ext uri="{91240B29-F687-4F45-9708-019B960494DF}">
+              <a14:hiddenLine xmlns:a14="http://schemas.microsoft.com/office/drawing/2010/main" w="9525">
+                <a:solidFill>
+                  <a:srgbClr val="000000"/>
+                </a:solidFill>
+                <a:miter lim="800000"/>
+                <a:headEnd/>
+                <a:tailEnd/>
+              </a14:hiddenLine>
+            </a:ext>
+          </a:extLst>
+        </p:spPr>
+        <p:txBody>
+          <a:bodyPr wrap="square">
+            <a:spAutoFit/>
+          </a:bodyPr>
+          <a:lstStyle>
+            <a:lvl1pPr>
+              <a:defRPr>
+                <a:solidFill>
+                  <a:schemeClr val="tx1"/>
+                </a:solidFill>
+                <a:latin typeface="Calibri" panose="020F0502020204030204" pitchFamily="34" charset="0"/>
+              </a:defRPr>
+            </a:lvl1pPr>
+            <a:lvl2pPr marL="742950" indent="-285750">
+              <a:defRPr>
+                <a:solidFill>
+                  <a:schemeClr val="tx1"/>
+                </a:solidFill>
+                <a:latin typeface="Calibri" panose="020F0502020204030204" pitchFamily="34" charset="0"/>
+              </a:defRPr>
+            </a:lvl2pPr>
+            <a:lvl3pPr marL="1143000" indent="-228600">
+              <a:defRPr>
+                <a:solidFill>
+                  <a:schemeClr val="tx1"/>
+                </a:solidFill>
+                <a:latin typeface="Calibri" panose="020F0502020204030204" pitchFamily="34" charset="0"/>
+              </a:defRPr>
+            </a:lvl3pPr>
+            <a:lvl4pPr marL="1600200" indent="-228600">
+              <a:defRPr>
+                <a:solidFill>
+                  <a:schemeClr val="tx1"/>
+                </a:solidFill>
+                <a:latin typeface="Calibri" panose="020F0502020204030204" pitchFamily="34" charset="0"/>
+              </a:defRPr>
+            </a:lvl4pPr>
+            <a:lvl5pPr marL="2057400" indent="-228600">
+              <a:defRPr>
+                <a:solidFill>
+                  <a:schemeClr val="tx1"/>
+                </a:solidFill>
+                <a:latin typeface="Calibri" panose="020F0502020204030204" pitchFamily="34" charset="0"/>
+              </a:defRPr>
+            </a:lvl5pPr>
+            <a:lvl6pPr marL="2514600" indent="-228600" eaLnBrk="0" fontAlgn="base" hangingPunct="0">
+              <a:spcBef>
+                <a:spcPct val="0"/>
+              </a:spcBef>
+              <a:spcAft>
+                <a:spcPct val="0"/>
+              </a:spcAft>
+              <a:defRPr>
+                <a:solidFill>
+                  <a:schemeClr val="tx1"/>
+                </a:solidFill>
+                <a:latin typeface="Calibri" panose="020F0502020204030204" pitchFamily="34" charset="0"/>
+              </a:defRPr>
+            </a:lvl6pPr>
+            <a:lvl7pPr marL="2971800" indent="-228600" eaLnBrk="0" fontAlgn="base" hangingPunct="0">
+              <a:spcBef>
+                <a:spcPct val="0"/>
+              </a:spcBef>
+              <a:spcAft>
+                <a:spcPct val="0"/>
+              </a:spcAft>
+              <a:defRPr>
+                <a:solidFill>
+                  <a:schemeClr val="tx1"/>
+                </a:solidFill>
+                <a:latin typeface="Calibri" panose="020F0502020204030204" pitchFamily="34" charset="0"/>
+              </a:defRPr>
+            </a:lvl7pPr>
+            <a:lvl8pPr marL="3429000" indent="-228600" eaLnBrk="0" fontAlgn="base" hangingPunct="0">
+              <a:spcBef>
+                <a:spcPct val="0"/>
+              </a:spcBef>
+              <a:spcAft>
+                <a:spcPct val="0"/>
+              </a:spcAft>
+              <a:defRPr>
+                <a:solidFill>
+                  <a:schemeClr val="tx1"/>
+                </a:solidFill>
+                <a:latin typeface="Calibri" panose="020F0502020204030204" pitchFamily="34" charset="0"/>
+              </a:defRPr>
+            </a:lvl8pPr>
+            <a:lvl9pPr marL="3886200" indent="-228600" eaLnBrk="0" fontAlgn="base" hangingPunct="0">
+              <a:spcBef>
+                <a:spcPct val="0"/>
+              </a:spcBef>
+              <a:spcAft>
+                <a:spcPct val="0"/>
+              </a:spcAft>
+              <a:defRPr>
+                <a:solidFill>
+                  <a:schemeClr val="tx1"/>
+                </a:solidFill>
+                <a:latin typeface="Calibri" panose="020F0502020204030204" pitchFamily="34" charset="0"/>
+              </a:defRPr>
+            </a:lvl9pPr>
+          </a:lstStyle>
+          <a:p>
+            <a:pPr algn="ctr" eaLnBrk="1" hangingPunct="1"/>
+            <a:r>
+              <a:rPr lang="en-US" altLang="en-US" sz="1100" smtClean="0">
+                <a:latin typeface="Arial" panose="020B0604020202020204" pitchFamily="34" charset="0"/>
+                <a:ea typeface="Amazon Ember" panose="020B0603020204020204" pitchFamily="34" charset="0"/>
+                <a:cs typeface="Arial" panose="020B0604020202020204" pitchFamily="34" charset="0"/>
+              </a:rPr>
+              <a:t>ElastiCache Redis </a:t>
+            </a:r>
+            <a:r>
+              <a:rPr lang="en-US" altLang="en-US" sz="1100" dirty="0">
+                <a:latin typeface="Arial" panose="020B0604020202020204" pitchFamily="34" charset="0"/>
+                <a:ea typeface="Amazon Ember" panose="020B0603020204020204" pitchFamily="34" charset="0"/>
+                <a:cs typeface="Arial" panose="020B0604020202020204" pitchFamily="34" charset="0"/>
+              </a:rPr>
+              <a:t>node</a:t>
+            </a:r>
+          </a:p>
+        </p:txBody>
+      </p:sp>
+      <p:sp>
+        <p:nvSpPr>
+          <p:cNvPr id="99" name="TextBox 8">
+            <a:extLst>
+              <a:ext uri="{FF2B5EF4-FFF2-40B4-BE49-F238E27FC236}">
+                <a16:creationId xmlns:a16="http://schemas.microsoft.com/office/drawing/2014/main" id="{9A51BFEC-955C-E444-A046-8E4A45B6EFDA}"/>
+              </a:ext>
+            </a:extLst>
+          </p:cNvPr>
+          <p:cNvSpPr txBox="1">
+            <a:spLocks noChangeArrowheads="1"/>
+          </p:cNvSpPr>
+          <p:nvPr/>
+        </p:nvSpPr>
+        <p:spPr bwMode="auto">
+          <a:xfrm>
+            <a:off x="9062193" y="6510528"/>
+            <a:ext cx="801100" cy="430887"/>
+          </a:xfrm>
+          <a:prstGeom prst="rect">
+            <a:avLst/>
+          </a:prstGeom>
+          <a:noFill/>
+          <a:ln>
+            <a:noFill/>
+          </a:ln>
+          <a:extLst>
+            <a:ext uri="{909E8E84-426E-40DD-AFC4-6F175D3DCCD1}">
+              <a14:hiddenFill xmlns:a14="http://schemas.microsoft.com/office/drawing/2010/main">
+                <a:solidFill>
+                  <a:srgbClr val="FFFFFF"/>
+                </a:solidFill>
+              </a14:hiddenFill>
+            </a:ext>
+            <a:ext uri="{91240B29-F687-4F45-9708-019B960494DF}">
+              <a14:hiddenLine xmlns:a14="http://schemas.microsoft.com/office/drawing/2010/main" w="9525">
+                <a:solidFill>
+                  <a:srgbClr val="000000"/>
+                </a:solidFill>
+                <a:miter lim="800000"/>
+                <a:headEnd/>
+                <a:tailEnd/>
+              </a14:hiddenLine>
+            </a:ext>
+          </a:extLst>
+        </p:spPr>
+        <p:txBody>
+          <a:bodyPr wrap="square">
+            <a:spAutoFit/>
+          </a:bodyPr>
+          <a:lstStyle>
+            <a:lvl1pPr>
+              <a:defRPr>
+                <a:solidFill>
+                  <a:schemeClr val="tx1"/>
+                </a:solidFill>
+                <a:latin typeface="Calibri" panose="020F0502020204030204" pitchFamily="34" charset="0"/>
+              </a:defRPr>
+            </a:lvl1pPr>
+            <a:lvl2pPr marL="742950" indent="-285750">
+              <a:defRPr>
+                <a:solidFill>
+                  <a:schemeClr val="tx1"/>
+                </a:solidFill>
+                <a:latin typeface="Calibri" panose="020F0502020204030204" pitchFamily="34" charset="0"/>
+              </a:defRPr>
+            </a:lvl2pPr>
+            <a:lvl3pPr marL="1143000" indent="-228600">
+              <a:defRPr>
+                <a:solidFill>
+                  <a:schemeClr val="tx1"/>
+                </a:solidFill>
+                <a:latin typeface="Calibri" panose="020F0502020204030204" pitchFamily="34" charset="0"/>
+              </a:defRPr>
+            </a:lvl3pPr>
+            <a:lvl4pPr marL="1600200" indent="-228600">
+              <a:defRPr>
+                <a:solidFill>
+                  <a:schemeClr val="tx1"/>
+                </a:solidFill>
+                <a:latin typeface="Calibri" panose="020F0502020204030204" pitchFamily="34" charset="0"/>
+              </a:defRPr>
+            </a:lvl4pPr>
+            <a:lvl5pPr marL="2057400" indent="-228600">
+              <a:defRPr>
+                <a:solidFill>
+                  <a:schemeClr val="tx1"/>
+                </a:solidFill>
+                <a:latin typeface="Calibri" panose="020F0502020204030204" pitchFamily="34" charset="0"/>
+              </a:defRPr>
+            </a:lvl5pPr>
+            <a:lvl6pPr marL="2514600" indent="-228600" eaLnBrk="0" fontAlgn="base" hangingPunct="0">
+              <a:spcBef>
+                <a:spcPct val="0"/>
+              </a:spcBef>
+              <a:spcAft>
+                <a:spcPct val="0"/>
+              </a:spcAft>
+              <a:defRPr>
+                <a:solidFill>
+                  <a:schemeClr val="tx1"/>
+                </a:solidFill>
+                <a:latin typeface="Calibri" panose="020F0502020204030204" pitchFamily="34" charset="0"/>
+              </a:defRPr>
+            </a:lvl6pPr>
+            <a:lvl7pPr marL="2971800" indent="-228600" eaLnBrk="0" fontAlgn="base" hangingPunct="0">
+              <a:spcBef>
+                <a:spcPct val="0"/>
+              </a:spcBef>
+              <a:spcAft>
+                <a:spcPct val="0"/>
+              </a:spcAft>
+              <a:defRPr>
+                <a:solidFill>
+                  <a:schemeClr val="tx1"/>
+                </a:solidFill>
+                <a:latin typeface="Calibri" panose="020F0502020204030204" pitchFamily="34" charset="0"/>
+              </a:defRPr>
+            </a:lvl7pPr>
+            <a:lvl8pPr marL="3429000" indent="-228600" eaLnBrk="0" fontAlgn="base" hangingPunct="0">
+              <a:spcBef>
+                <a:spcPct val="0"/>
+              </a:spcBef>
+              <a:spcAft>
+                <a:spcPct val="0"/>
+              </a:spcAft>
+              <a:defRPr>
+                <a:solidFill>
+                  <a:schemeClr val="tx1"/>
+                </a:solidFill>
+                <a:latin typeface="Calibri" panose="020F0502020204030204" pitchFamily="34" charset="0"/>
+              </a:defRPr>
+            </a:lvl8pPr>
+            <a:lvl9pPr marL="3886200" indent="-228600" eaLnBrk="0" fontAlgn="base" hangingPunct="0">
+              <a:spcBef>
+                <a:spcPct val="0"/>
+              </a:spcBef>
+              <a:spcAft>
+                <a:spcPct val="0"/>
+              </a:spcAft>
+              <a:defRPr>
+                <a:solidFill>
+                  <a:schemeClr val="tx1"/>
+                </a:solidFill>
+                <a:latin typeface="Calibri" panose="020F0502020204030204" pitchFamily="34" charset="0"/>
+              </a:defRPr>
+            </a:lvl9pPr>
+          </a:lstStyle>
+          <a:p>
+            <a:pPr algn="ctr" eaLnBrk="1" hangingPunct="1"/>
+            <a:r>
+              <a:rPr lang="en-US" altLang="en-US" sz="1100" dirty="0">
+                <a:latin typeface="Arial" panose="020B0604020202020204" pitchFamily="34" charset="0"/>
+                <a:ea typeface="Amazon Ember" panose="020B0603020204020204" pitchFamily="34" charset="0"/>
+                <a:cs typeface="Arial" panose="020B0604020202020204" pitchFamily="34" charset="0"/>
+              </a:rPr>
+              <a:t>MySQL</a:t>
+            </a:r>
+          </a:p>
+          <a:p>
+            <a:pPr algn="ctr" eaLnBrk="1" hangingPunct="1"/>
+            <a:r>
+              <a:rPr lang="en-US" altLang="en-US" sz="1100" dirty="0">
+                <a:latin typeface="Arial" panose="020B0604020202020204" pitchFamily="34" charset="0"/>
+                <a:ea typeface="Amazon Ember" panose="020B0603020204020204" pitchFamily="34" charset="0"/>
+                <a:cs typeface="Arial" panose="020B0604020202020204" pitchFamily="34" charset="0"/>
+              </a:rPr>
+              <a:t>instance</a:t>
+            </a:r>
+          </a:p>
+        </p:txBody>
+      </p:sp>
+      <p:pic>
+        <p:nvPicPr>
+          <p:cNvPr id="101" name="Graphic 24">
+            <a:extLst>
+              <a:ext uri="{FF2B5EF4-FFF2-40B4-BE49-F238E27FC236}">
+                <a16:creationId xmlns:a16="http://schemas.microsoft.com/office/drawing/2014/main" id="{1BB1A929-4B62-3040-9466-CB51DB3ACE7D}"/>
+              </a:ext>
+            </a:extLst>
+          </p:cNvPr>
+          <p:cNvPicPr>
+            <a:picLocks noChangeAspect="1" noChangeArrowheads="1"/>
+          </p:cNvPicPr>
+          <p:nvPr/>
+        </p:nvPicPr>
+        <p:blipFill>
+          <a:blip r:embed="rId34">
+            <a:extLst>
+              <a:ext uri="{28A0092B-C50C-407E-A947-70E740481C1C}">
+                <a14:useLocalDpi xmlns:a14="http://schemas.microsoft.com/office/drawing/2010/main" val="0"/>
+              </a:ext>
+            </a:extLst>
+          </a:blip>
+          <a:srcRect/>
+          <a:stretch>
+            <a:fillRect/>
+          </a:stretch>
+        </p:blipFill>
+        <p:spPr bwMode="auto">
+          <a:xfrm>
+            <a:off x="8321040" y="6037719"/>
+            <a:ext cx="457200" cy="457200"/>
+          </a:xfrm>
+          <a:prstGeom prst="rect">
+            <a:avLst/>
+          </a:prstGeom>
+          <a:noFill/>
+          <a:ln>
+            <a:noFill/>
+          </a:ln>
+          <a:extLst>
+            <a:ext uri="{909E8E84-426E-40DD-AFC4-6F175D3DCCD1}">
+              <a14:hiddenFill xmlns:a14="http://schemas.microsoft.com/office/drawing/2010/main">
+                <a:solidFill>
+                  <a:srgbClr val="FFFFFF"/>
+                </a:solidFill>
+              </a14:hiddenFill>
+            </a:ext>
+            <a:ext uri="{91240B29-F687-4F45-9708-019B960494DF}">
+              <a14:hiddenLine xmlns:a14="http://schemas.microsoft.com/office/drawing/2010/main" w="9525">
+                <a:solidFill>
+                  <a:srgbClr val="000000"/>
+                </a:solidFill>
+                <a:miter lim="800000"/>
+                <a:headEnd/>
+                <a:tailEnd/>
+              </a14:hiddenLine>
+            </a:ext>
+          </a:extLst>
+        </p:spPr>
+      </p:pic>
+      <p:pic>
+        <p:nvPicPr>
+          <p:cNvPr id="102" name="Graphic 23">
+            <a:extLst>
+              <a:ext uri="{FF2B5EF4-FFF2-40B4-BE49-F238E27FC236}">
+                <a16:creationId xmlns:a16="http://schemas.microsoft.com/office/drawing/2014/main" id="{6C7F2A04-6606-F843-89BB-7B833BB637DF}"/>
+              </a:ext>
+            </a:extLst>
+          </p:cNvPr>
+          <p:cNvPicPr>
+            <a:picLocks noChangeAspect="1" noChangeArrowheads="1"/>
+          </p:cNvPicPr>
+          <p:nvPr/>
+        </p:nvPicPr>
+        <p:blipFill>
+          <a:blip r:embed="rId35">
+            <a:extLst>
+              <a:ext uri="{28A0092B-C50C-407E-A947-70E740481C1C}">
+                <a14:useLocalDpi xmlns:a14="http://schemas.microsoft.com/office/drawing/2010/main" val="0"/>
+              </a:ext>
+            </a:extLst>
+          </a:blip>
+          <a:srcRect/>
+          <a:stretch>
+            <a:fillRect/>
+          </a:stretch>
+        </p:blipFill>
+        <p:spPr bwMode="auto">
+          <a:xfrm>
+            <a:off x="3840480" y="6035040"/>
+            <a:ext cx="457200" cy="457200"/>
+          </a:xfrm>
+          <a:prstGeom prst="rect">
+            <a:avLst/>
+          </a:prstGeom>
+          <a:noFill/>
+          <a:ln>
+            <a:noFill/>
+          </a:ln>
+          <a:extLst>
+            <a:ext uri="{909E8E84-426E-40DD-AFC4-6F175D3DCCD1}">
+              <a14:hiddenFill xmlns:a14="http://schemas.microsoft.com/office/drawing/2010/main">
+                <a:solidFill>
+                  <a:srgbClr val="FFFFFF"/>
+                </a:solidFill>
+              </a14:hiddenFill>
+            </a:ext>
+            <a:ext uri="{91240B29-F687-4F45-9708-019B960494DF}">
+              <a14:hiddenLine xmlns:a14="http://schemas.microsoft.com/office/drawing/2010/main" w="9525">
+                <a:solidFill>
+                  <a:srgbClr val="000000"/>
+                </a:solidFill>
+                <a:miter lim="800000"/>
+                <a:headEnd/>
+                <a:tailEnd/>
+              </a14:hiddenLine>
+            </a:ext>
+          </a:extLst>
+        </p:spPr>
+      </p:pic>
+      <p:pic>
+        <p:nvPicPr>
+          <p:cNvPr id="103" name="Graphic 23">
+            <a:extLst>
+              <a:ext uri="{FF2B5EF4-FFF2-40B4-BE49-F238E27FC236}">
+                <a16:creationId xmlns:a16="http://schemas.microsoft.com/office/drawing/2014/main" id="{6C7F2A04-6606-F843-89BB-7B833BB637DF}"/>
+              </a:ext>
+            </a:extLst>
+          </p:cNvPr>
+          <p:cNvPicPr>
+            <a:picLocks noChangeAspect="1" noChangeArrowheads="1"/>
+          </p:cNvPicPr>
+          <p:nvPr/>
+        </p:nvPicPr>
+        <p:blipFill>
+          <a:blip r:embed="rId35">
+            <a:extLst>
+              <a:ext uri="{28A0092B-C50C-407E-A947-70E740481C1C}">
+                <a14:useLocalDpi xmlns:a14="http://schemas.microsoft.com/office/drawing/2010/main" val="0"/>
+              </a:ext>
+            </a:extLst>
+          </a:blip>
+          <a:srcRect/>
+          <a:stretch>
+            <a:fillRect/>
+          </a:stretch>
+        </p:blipFill>
+        <p:spPr bwMode="auto">
+          <a:xfrm>
+            <a:off x="6949440" y="6035040"/>
+            <a:ext cx="457200" cy="457200"/>
+          </a:xfrm>
+          <a:prstGeom prst="rect">
+            <a:avLst/>
+          </a:prstGeom>
+          <a:noFill/>
+          <a:ln>
+            <a:noFill/>
+          </a:ln>
+          <a:extLst>
+            <a:ext uri="{909E8E84-426E-40DD-AFC4-6F175D3DCCD1}">
+              <a14:hiddenFill xmlns:a14="http://schemas.microsoft.com/office/drawing/2010/main">
+                <a:solidFill>
+                  <a:srgbClr val="FFFFFF"/>
+                </a:solidFill>
+              </a14:hiddenFill>
+            </a:ext>
+            <a:ext uri="{91240B29-F687-4F45-9708-019B960494DF}">
+              <a14:hiddenLine xmlns:a14="http://schemas.microsoft.com/office/drawing/2010/main" w="9525">
+                <a:solidFill>
+                  <a:srgbClr val="000000"/>
+                </a:solidFill>
+                <a:miter lim="800000"/>
+                <a:headEnd/>
+                <a:tailEnd/>
+              </a14:hiddenLine>
+            </a:ext>
+          </a:extLst>
+        </p:spPr>
+      </p:pic>
+      <p:pic>
+        <p:nvPicPr>
+          <p:cNvPr id="104" name="Graphic 23">
+            <a:extLst>
+              <a:ext uri="{FF2B5EF4-FFF2-40B4-BE49-F238E27FC236}">
+                <a16:creationId xmlns:a16="http://schemas.microsoft.com/office/drawing/2014/main" id="{6C7F2A04-6606-F843-89BB-7B833BB637DF}"/>
+              </a:ext>
+            </a:extLst>
+          </p:cNvPr>
+          <p:cNvPicPr>
+            <a:picLocks noChangeAspect="1" noChangeArrowheads="1"/>
+          </p:cNvPicPr>
+          <p:nvPr/>
+        </p:nvPicPr>
+        <p:blipFill>
+          <a:blip r:embed="rId35">
+            <a:extLst>
+              <a:ext uri="{28A0092B-C50C-407E-A947-70E740481C1C}">
+                <a14:useLocalDpi xmlns:a14="http://schemas.microsoft.com/office/drawing/2010/main" val="0"/>
+              </a:ext>
+            </a:extLst>
+          </a:blip>
+          <a:srcRect/>
+          <a:stretch>
+            <a:fillRect/>
+          </a:stretch>
+        </p:blipFill>
+        <p:spPr bwMode="auto">
+          <a:xfrm>
+            <a:off x="9235440" y="6031055"/>
+            <a:ext cx="457200" cy="457200"/>
+          </a:xfrm>
+          <a:prstGeom prst="rect">
+            <a:avLst/>
+          </a:prstGeom>
+          <a:noFill/>
+          <a:ln>
+            <a:noFill/>
+          </a:ln>
+          <a:extLst>
+            <a:ext uri="{909E8E84-426E-40DD-AFC4-6F175D3DCCD1}">
+              <a14:hiddenFill xmlns:a14="http://schemas.microsoft.com/office/drawing/2010/main">
+                <a:solidFill>
+                  <a:srgbClr val="FFFFFF"/>
+                </a:solidFill>
+              </a14:hiddenFill>
+            </a:ext>
+            <a:ext uri="{91240B29-F687-4F45-9708-019B960494DF}">
+              <a14:hiddenLine xmlns:a14="http://schemas.microsoft.com/office/drawing/2010/main" w="9525">
+                <a:solidFill>
+                  <a:srgbClr val="000000"/>
+                </a:solidFill>
+                <a:miter lim="800000"/>
+                <a:headEnd/>
+                <a:tailEnd/>
+              </a14:hiddenLine>
+            </a:ext>
+          </a:extLst>
+        </p:spPr>
+      </p:pic>
     </p:spTree>
     <p:extLst>
       <p:ext uri="{BB962C8B-B14F-4D97-AF65-F5344CB8AC3E}">

</xml_diff>